<commit_message>
adding the user-defined meta-paths subsubsection
</commit_message>
<xml_diff>
--- a/paper/presentation.pptx
+++ b/paper/presentation.pptx
@@ -1,31 +1,126 @@
 
 <file path=ppt/presentation.xml><?xml version="1.0" encoding="utf-8"?>
-<p:presentation xmlns:a="http://schemas.openxmlformats.org/drawingml/2006/main" xmlns:p="http://schemas.openxmlformats.org/presentationml/2006/main" xmlns:r="http://schemas.openxmlformats.org/officeDocument/2006/relationships">
+<p:presentation xmlns:a="http://schemas.openxmlformats.org/drawingml/2006/main" xmlns:r="http://schemas.openxmlformats.org/officeDocument/2006/relationships" xmlns:p="http://schemas.openxmlformats.org/presentationml/2006/main">
   <p:sldMasterIdLst>
-    <p:sldMasterId id="2147483648" r:id="rId2"/>
-    <p:sldMasterId id="2147483661" r:id="rId3"/>
+    <p:sldMasterId id="2147483648" r:id="rId1"/>
+    <p:sldMasterId id="2147483661" r:id="rId2"/>
   </p:sldMasterIdLst>
   <p:sldIdLst>
-    <p:sldId id="256" r:id="rId4"/>
-    <p:sldId id="257" r:id="rId5"/>
-    <p:sldId id="258" r:id="rId6"/>
-    <p:sldId id="259" r:id="rId7"/>
-    <p:sldId id="260" r:id="rId8"/>
-    <p:sldId id="261" r:id="rId9"/>
-    <p:sldId id="262" r:id="rId10"/>
-    <p:sldId id="263" r:id="rId11"/>
-    <p:sldId id="264" r:id="rId12"/>
-    <p:sldId id="265" r:id="rId13"/>
-    <p:sldId id="266" r:id="rId14"/>
-    <p:sldId id="267" r:id="rId15"/>
+    <p:sldId id="256" r:id="rId3"/>
+    <p:sldId id="257" r:id="rId4"/>
+    <p:sldId id="258" r:id="rId5"/>
+    <p:sldId id="259" r:id="rId6"/>
+    <p:sldId id="260" r:id="rId7"/>
+    <p:sldId id="261" r:id="rId8"/>
+    <p:sldId id="262" r:id="rId9"/>
+    <p:sldId id="263" r:id="rId10"/>
+    <p:sldId id="264" r:id="rId11"/>
+    <p:sldId id="265" r:id="rId12"/>
+    <p:sldId id="266" r:id="rId13"/>
+    <p:sldId id="267" r:id="rId14"/>
   </p:sldIdLst>
-  <p:sldSz cx="9144000" cy="6858000"/>
+  <p:sldSz cx="9144000" cy="6858000" type="screen4x3"/>
   <p:notesSz cx="7772400" cy="10058400"/>
+  <p:defaultTextStyle>
+    <a:defPPr>
+      <a:defRPr lang="en-US"/>
+    </a:defPPr>
+    <a:lvl1pPr marL="0" algn="l" defTabSz="457200" rtl="0" eaLnBrk="1" latinLnBrk="0" hangingPunct="1">
+      <a:defRPr sz="1800" kern="1200">
+        <a:solidFill>
+          <a:schemeClr val="tx1"/>
+        </a:solidFill>
+        <a:latin typeface="+mn-lt"/>
+        <a:ea typeface="+mn-ea"/>
+        <a:cs typeface="+mn-cs"/>
+      </a:defRPr>
+    </a:lvl1pPr>
+    <a:lvl2pPr marL="457200" algn="l" defTabSz="457200" rtl="0" eaLnBrk="1" latinLnBrk="0" hangingPunct="1">
+      <a:defRPr sz="1800" kern="1200">
+        <a:solidFill>
+          <a:schemeClr val="tx1"/>
+        </a:solidFill>
+        <a:latin typeface="+mn-lt"/>
+        <a:ea typeface="+mn-ea"/>
+        <a:cs typeface="+mn-cs"/>
+      </a:defRPr>
+    </a:lvl2pPr>
+    <a:lvl3pPr marL="914400" algn="l" defTabSz="457200" rtl="0" eaLnBrk="1" latinLnBrk="0" hangingPunct="1">
+      <a:defRPr sz="1800" kern="1200">
+        <a:solidFill>
+          <a:schemeClr val="tx1"/>
+        </a:solidFill>
+        <a:latin typeface="+mn-lt"/>
+        <a:ea typeface="+mn-ea"/>
+        <a:cs typeface="+mn-cs"/>
+      </a:defRPr>
+    </a:lvl3pPr>
+    <a:lvl4pPr marL="1371600" algn="l" defTabSz="457200" rtl="0" eaLnBrk="1" latinLnBrk="0" hangingPunct="1">
+      <a:defRPr sz="1800" kern="1200">
+        <a:solidFill>
+          <a:schemeClr val="tx1"/>
+        </a:solidFill>
+        <a:latin typeface="+mn-lt"/>
+        <a:ea typeface="+mn-ea"/>
+        <a:cs typeface="+mn-cs"/>
+      </a:defRPr>
+    </a:lvl4pPr>
+    <a:lvl5pPr marL="1828800" algn="l" defTabSz="457200" rtl="0" eaLnBrk="1" latinLnBrk="0" hangingPunct="1">
+      <a:defRPr sz="1800" kern="1200">
+        <a:solidFill>
+          <a:schemeClr val="tx1"/>
+        </a:solidFill>
+        <a:latin typeface="+mn-lt"/>
+        <a:ea typeface="+mn-ea"/>
+        <a:cs typeface="+mn-cs"/>
+      </a:defRPr>
+    </a:lvl5pPr>
+    <a:lvl6pPr marL="2286000" algn="l" defTabSz="457200" rtl="0" eaLnBrk="1" latinLnBrk="0" hangingPunct="1">
+      <a:defRPr sz="1800" kern="1200">
+        <a:solidFill>
+          <a:schemeClr val="tx1"/>
+        </a:solidFill>
+        <a:latin typeface="+mn-lt"/>
+        <a:ea typeface="+mn-ea"/>
+        <a:cs typeface="+mn-cs"/>
+      </a:defRPr>
+    </a:lvl6pPr>
+    <a:lvl7pPr marL="2743200" algn="l" defTabSz="457200" rtl="0" eaLnBrk="1" latinLnBrk="0" hangingPunct="1">
+      <a:defRPr sz="1800" kern="1200">
+        <a:solidFill>
+          <a:schemeClr val="tx1"/>
+        </a:solidFill>
+        <a:latin typeface="+mn-lt"/>
+        <a:ea typeface="+mn-ea"/>
+        <a:cs typeface="+mn-cs"/>
+      </a:defRPr>
+    </a:lvl7pPr>
+    <a:lvl8pPr marL="3200400" algn="l" defTabSz="457200" rtl="0" eaLnBrk="1" latinLnBrk="0" hangingPunct="1">
+      <a:defRPr sz="1800" kern="1200">
+        <a:solidFill>
+          <a:schemeClr val="tx1"/>
+        </a:solidFill>
+        <a:latin typeface="+mn-lt"/>
+        <a:ea typeface="+mn-ea"/>
+        <a:cs typeface="+mn-cs"/>
+      </a:defRPr>
+    </a:lvl8pPr>
+    <a:lvl9pPr marL="3657600" algn="l" defTabSz="457200" rtl="0" eaLnBrk="1" latinLnBrk="0" hangingPunct="1">
+      <a:defRPr sz="1800" kern="1200">
+        <a:solidFill>
+          <a:schemeClr val="tx1"/>
+        </a:solidFill>
+        <a:latin typeface="+mn-lt"/>
+        <a:ea typeface="+mn-ea"/>
+        <a:cs typeface="+mn-cs"/>
+      </a:defRPr>
+    </a:lvl9pPr>
+  </p:defaultTextStyle>
 </p:presentation>
 </file>
 
 <file path=ppt/slideLayouts/slideLayout1.xml><?xml version="1.0" encoding="utf-8"?>
-<p:sldLayout xmlns:a="http://schemas.openxmlformats.org/drawingml/2006/main" xmlns:p="http://schemas.openxmlformats.org/presentationml/2006/main" xmlns:r="http://schemas.openxmlformats.org/officeDocument/2006/relationships" type="blank" preserve="1">
+<p:sldLayout xmlns:a="http://schemas.openxmlformats.org/drawingml/2006/main" xmlns:r="http://schemas.openxmlformats.org/officeDocument/2006/relationships" xmlns:p="http://schemas.openxmlformats.org/presentationml/2006/main" type="blank" preserve="1">
   <p:cSld name="Blank Slide">
     <p:spTree>
       <p:nvGrpSpPr>
@@ -43,11 +138,14 @@
       </p:grpSpPr>
     </p:spTree>
   </p:cSld>
+  <p:clrMapOvr>
+    <a:masterClrMapping/>
+  </p:clrMapOvr>
 </p:sldLayout>
 </file>
 
 <file path=ppt/slideLayouts/slideLayout10.xml><?xml version="1.0" encoding="utf-8"?>
-<p:sldLayout xmlns:a="http://schemas.openxmlformats.org/drawingml/2006/main" xmlns:p="http://schemas.openxmlformats.org/presentationml/2006/main" xmlns:r="http://schemas.openxmlformats.org/officeDocument/2006/relationships" type="objOverTx" preserve="1">
+<p:sldLayout xmlns:a="http://schemas.openxmlformats.org/drawingml/2006/main" xmlns:r="http://schemas.openxmlformats.org/officeDocument/2006/relationships" xmlns:p="http://schemas.openxmlformats.org/presentationml/2006/main" type="objOverTx" preserve="1">
   <p:cSld name="Title, Content over Content">
     <p:spTree>
       <p:nvGrpSpPr>
@@ -83,7 +181,8 @@
           </a:prstGeom>
         </p:spPr>
         <p:txBody>
-          <a:bodyPr wrap="none" lIns="0" rIns="0" tIns="0" bIns="0" anchor="ctr"/>
+          <a:bodyPr wrap="none" lIns="0" tIns="0" rIns="0" bIns="0" anchor="ctr"/>
+          <a:lstStyle/>
           <a:p>
             <a:endParaRPr/>
           </a:p>
@@ -109,7 +208,8 @@
           </a:prstGeom>
         </p:spPr>
         <p:txBody>
-          <a:bodyPr wrap="none" lIns="0" rIns="0" tIns="0" bIns="0"/>
+          <a:bodyPr wrap="none" lIns="0" tIns="0" rIns="0" bIns="0"/>
+          <a:lstStyle/>
           <a:p>
             <a:endParaRPr/>
           </a:p>
@@ -135,7 +235,8 @@
           </a:prstGeom>
         </p:spPr>
         <p:txBody>
-          <a:bodyPr wrap="none" lIns="0" rIns="0" tIns="0" bIns="0"/>
+          <a:bodyPr wrap="none" lIns="0" tIns="0" rIns="0" bIns="0"/>
+          <a:lstStyle/>
           <a:p>
             <a:endParaRPr/>
           </a:p>
@@ -143,11 +244,14 @@
       </p:sp>
     </p:spTree>
   </p:cSld>
+  <p:clrMapOvr>
+    <a:masterClrMapping/>
+  </p:clrMapOvr>
 </p:sldLayout>
 </file>
 
 <file path=ppt/slideLayouts/slideLayout11.xml><?xml version="1.0" encoding="utf-8"?>
-<p:sldLayout xmlns:a="http://schemas.openxmlformats.org/drawingml/2006/main" xmlns:p="http://schemas.openxmlformats.org/presentationml/2006/main" xmlns:r="http://schemas.openxmlformats.org/officeDocument/2006/relationships" type="fourObj" preserve="1">
+<p:sldLayout xmlns:a="http://schemas.openxmlformats.org/drawingml/2006/main" xmlns:r="http://schemas.openxmlformats.org/officeDocument/2006/relationships" xmlns:p="http://schemas.openxmlformats.org/presentationml/2006/main" type="fourObj" preserve="1">
   <p:cSld name="Title, 4 Content">
     <p:spTree>
       <p:nvGrpSpPr>
@@ -183,7 +287,8 @@
           </a:prstGeom>
         </p:spPr>
         <p:txBody>
-          <a:bodyPr wrap="none" lIns="0" rIns="0" tIns="0" bIns="0" anchor="ctr"/>
+          <a:bodyPr wrap="none" lIns="0" tIns="0" rIns="0" bIns="0" anchor="ctr"/>
+          <a:lstStyle/>
           <a:p>
             <a:endParaRPr/>
           </a:p>
@@ -209,7 +314,8 @@
           </a:prstGeom>
         </p:spPr>
         <p:txBody>
-          <a:bodyPr wrap="none" lIns="0" rIns="0" tIns="0" bIns="0"/>
+          <a:bodyPr wrap="none" lIns="0" tIns="0" rIns="0" bIns="0"/>
+          <a:lstStyle/>
           <a:p>
             <a:endParaRPr/>
           </a:p>
@@ -235,7 +341,8 @@
           </a:prstGeom>
         </p:spPr>
         <p:txBody>
-          <a:bodyPr wrap="none" lIns="0" rIns="0" tIns="0" bIns="0"/>
+          <a:bodyPr wrap="none" lIns="0" tIns="0" rIns="0" bIns="0"/>
+          <a:lstStyle/>
           <a:p>
             <a:endParaRPr/>
           </a:p>
@@ -261,7 +368,8 @@
           </a:prstGeom>
         </p:spPr>
         <p:txBody>
-          <a:bodyPr wrap="none" lIns="0" rIns="0" tIns="0" bIns="0"/>
+          <a:bodyPr wrap="none" lIns="0" tIns="0" rIns="0" bIns="0"/>
+          <a:lstStyle/>
           <a:p>
             <a:endParaRPr/>
           </a:p>
@@ -287,7 +395,8 @@
           </a:prstGeom>
         </p:spPr>
         <p:txBody>
-          <a:bodyPr wrap="none" lIns="0" rIns="0" tIns="0" bIns="0"/>
+          <a:bodyPr wrap="none" lIns="0" tIns="0" rIns="0" bIns="0"/>
+          <a:lstStyle/>
           <a:p>
             <a:endParaRPr/>
           </a:p>
@@ -295,11 +404,14 @@
       </p:sp>
     </p:spTree>
   </p:cSld>
+  <p:clrMapOvr>
+    <a:masterClrMapping/>
+  </p:clrMapOvr>
 </p:sldLayout>
 </file>
 
 <file path=ppt/slideLayouts/slideLayout12.xml><?xml version="1.0" encoding="utf-8"?>
-<p:sldLayout xmlns:a="http://schemas.openxmlformats.org/drawingml/2006/main" xmlns:p="http://schemas.openxmlformats.org/presentationml/2006/main" xmlns:r="http://schemas.openxmlformats.org/officeDocument/2006/relationships" type="blank" preserve="1">
+<p:sldLayout xmlns:a="http://schemas.openxmlformats.org/drawingml/2006/main" xmlns:r="http://schemas.openxmlformats.org/officeDocument/2006/relationships" xmlns:p="http://schemas.openxmlformats.org/presentationml/2006/main" type="blank" preserve="1">
   <p:cSld name="Title, 6 Content">
     <p:spTree>
       <p:nvGrpSpPr>
@@ -335,7 +447,8 @@
           </a:prstGeom>
         </p:spPr>
         <p:txBody>
-          <a:bodyPr wrap="none" lIns="0" rIns="0" tIns="0" bIns="0" anchor="ctr"/>
+          <a:bodyPr wrap="none" lIns="0" tIns="0" rIns="0" bIns="0" anchor="ctr"/>
+          <a:lstStyle/>
           <a:p>
             <a:endParaRPr/>
           </a:p>
@@ -361,7 +474,8 @@
           </a:prstGeom>
         </p:spPr>
         <p:txBody>
-          <a:bodyPr wrap="none" lIns="0" rIns="0" tIns="0" bIns="0"/>
+          <a:bodyPr wrap="none" lIns="0" tIns="0" rIns="0" bIns="0"/>
+          <a:lstStyle/>
           <a:p>
             <a:endParaRPr/>
           </a:p>
@@ -387,7 +501,8 @@
           </a:prstGeom>
         </p:spPr>
         <p:txBody>
-          <a:bodyPr wrap="none" lIns="0" rIns="0" tIns="0" bIns="0"/>
+          <a:bodyPr wrap="none" lIns="0" tIns="0" rIns="0" bIns="0"/>
+          <a:lstStyle/>
           <a:p>
             <a:endParaRPr/>
           </a:p>
@@ -395,7 +510,7 @@
       </p:sp>
       <p:pic>
         <p:nvPicPr>
-          <p:cNvPr id="37" name="" descr=""/>
+          <p:cNvPr id="37" name="Picture 36"/>
           <p:cNvPicPr/>
           <p:nvPr/>
         </p:nvPicPr>
@@ -420,12 +535,12 @@
       </p:pic>
       <p:pic>
         <p:nvPicPr>
-          <p:cNvPr id="38" name="" descr=""/>
+          <p:cNvPr id="38" name="Picture 37"/>
           <p:cNvPicPr/>
           <p:nvPr/>
         </p:nvPicPr>
         <p:blipFill>
-          <a:blip r:embed="rId3"/>
+          <a:blip r:embed="rId2"/>
           <a:stretch>
             <a:fillRect/>
           </a:stretch>
@@ -445,11 +560,14 @@
       </p:pic>
     </p:spTree>
   </p:cSld>
+  <p:clrMapOvr>
+    <a:masterClrMapping/>
+  </p:clrMapOvr>
 </p:sldLayout>
 </file>
 
 <file path=ppt/slideLayouts/slideLayout13.xml><?xml version="1.0" encoding="utf-8"?>
-<p:sldLayout xmlns:a="http://schemas.openxmlformats.org/drawingml/2006/main" xmlns:p="http://schemas.openxmlformats.org/presentationml/2006/main" xmlns:r="http://schemas.openxmlformats.org/officeDocument/2006/relationships" type="blank" preserve="1">
+<p:sldLayout xmlns:a="http://schemas.openxmlformats.org/drawingml/2006/main" xmlns:r="http://schemas.openxmlformats.org/officeDocument/2006/relationships" xmlns:p="http://schemas.openxmlformats.org/presentationml/2006/main" type="blank" preserve="1">
   <p:cSld name="Blank Slide">
     <p:spTree>
       <p:nvGrpSpPr>
@@ -467,11 +585,14 @@
       </p:grpSpPr>
     </p:spTree>
   </p:cSld>
+  <p:clrMapOvr>
+    <a:masterClrMapping/>
+  </p:clrMapOvr>
 </p:sldLayout>
 </file>
 
 <file path=ppt/slideLayouts/slideLayout14.xml><?xml version="1.0" encoding="utf-8"?>
-<p:sldLayout xmlns:a="http://schemas.openxmlformats.org/drawingml/2006/main" xmlns:p="http://schemas.openxmlformats.org/presentationml/2006/main" xmlns:r="http://schemas.openxmlformats.org/officeDocument/2006/relationships" type="tx" preserve="1">
+<p:sldLayout xmlns:a="http://schemas.openxmlformats.org/drawingml/2006/main" xmlns:r="http://schemas.openxmlformats.org/officeDocument/2006/relationships" xmlns:p="http://schemas.openxmlformats.org/presentationml/2006/main" type="tx" preserve="1">
   <p:cSld name="Title Slide">
     <p:spTree>
       <p:nvGrpSpPr>
@@ -507,7 +628,8 @@
           </a:prstGeom>
         </p:spPr>
         <p:txBody>
-          <a:bodyPr wrap="none" lIns="0" rIns="0" tIns="0" bIns="0" anchor="ctr"/>
+          <a:bodyPr wrap="none" lIns="0" tIns="0" rIns="0" bIns="0" anchor="ctr"/>
+          <a:lstStyle/>
           <a:p>
             <a:endParaRPr/>
           </a:p>
@@ -533,7 +655,8 @@
           </a:prstGeom>
         </p:spPr>
         <p:txBody>
-          <a:bodyPr wrap="none" lIns="0" rIns="0" tIns="0" bIns="0" anchor="ctr"/>
+          <a:bodyPr wrap="none" lIns="0" tIns="0" rIns="0" bIns="0" anchor="ctr"/>
+          <a:lstStyle/>
           <a:p>
             <a:pPr algn="ctr"/>
             <a:endParaRPr/>
@@ -542,11 +665,14 @@
       </p:sp>
     </p:spTree>
   </p:cSld>
+  <p:clrMapOvr>
+    <a:masterClrMapping/>
+  </p:clrMapOvr>
 </p:sldLayout>
 </file>
 
 <file path=ppt/slideLayouts/slideLayout15.xml><?xml version="1.0" encoding="utf-8"?>
-<p:sldLayout xmlns:a="http://schemas.openxmlformats.org/drawingml/2006/main" xmlns:p="http://schemas.openxmlformats.org/presentationml/2006/main" xmlns:r="http://schemas.openxmlformats.org/officeDocument/2006/relationships" type="obj" preserve="1">
+<p:sldLayout xmlns:a="http://schemas.openxmlformats.org/drawingml/2006/main" xmlns:r="http://schemas.openxmlformats.org/officeDocument/2006/relationships" xmlns:p="http://schemas.openxmlformats.org/presentationml/2006/main" type="obj" preserve="1">
   <p:cSld name="Title, Content">
     <p:spTree>
       <p:nvGrpSpPr>
@@ -582,7 +708,8 @@
           </a:prstGeom>
         </p:spPr>
         <p:txBody>
-          <a:bodyPr wrap="none" lIns="0" rIns="0" tIns="0" bIns="0" anchor="ctr"/>
+          <a:bodyPr wrap="none" lIns="0" tIns="0" rIns="0" bIns="0" anchor="ctr"/>
+          <a:lstStyle/>
           <a:p>
             <a:endParaRPr/>
           </a:p>
@@ -608,7 +735,8 @@
           </a:prstGeom>
         </p:spPr>
         <p:txBody>
-          <a:bodyPr wrap="none" lIns="0" rIns="0" tIns="0" bIns="0"/>
+          <a:bodyPr wrap="none" lIns="0" tIns="0" rIns="0" bIns="0"/>
+          <a:lstStyle/>
           <a:p>
             <a:endParaRPr/>
           </a:p>
@@ -616,11 +744,14 @@
       </p:sp>
     </p:spTree>
   </p:cSld>
+  <p:clrMapOvr>
+    <a:masterClrMapping/>
+  </p:clrMapOvr>
 </p:sldLayout>
 </file>
 
 <file path=ppt/slideLayouts/slideLayout16.xml><?xml version="1.0" encoding="utf-8"?>
-<p:sldLayout xmlns:a="http://schemas.openxmlformats.org/drawingml/2006/main" xmlns:p="http://schemas.openxmlformats.org/presentationml/2006/main" xmlns:r="http://schemas.openxmlformats.org/officeDocument/2006/relationships" type="twoObj" preserve="1">
+<p:sldLayout xmlns:a="http://schemas.openxmlformats.org/drawingml/2006/main" xmlns:r="http://schemas.openxmlformats.org/officeDocument/2006/relationships" xmlns:p="http://schemas.openxmlformats.org/presentationml/2006/main" type="twoObj" preserve="1">
   <p:cSld name="Title, 2 Content">
     <p:spTree>
       <p:nvGrpSpPr>
@@ -656,7 +787,8 @@
           </a:prstGeom>
         </p:spPr>
         <p:txBody>
-          <a:bodyPr wrap="none" lIns="0" rIns="0" tIns="0" bIns="0" anchor="ctr"/>
+          <a:bodyPr wrap="none" lIns="0" tIns="0" rIns="0" bIns="0" anchor="ctr"/>
+          <a:lstStyle/>
           <a:p>
             <a:endParaRPr/>
           </a:p>
@@ -682,7 +814,8 @@
           </a:prstGeom>
         </p:spPr>
         <p:txBody>
-          <a:bodyPr wrap="none" lIns="0" rIns="0" tIns="0" bIns="0"/>
+          <a:bodyPr wrap="none" lIns="0" tIns="0" rIns="0" bIns="0"/>
+          <a:lstStyle/>
           <a:p>
             <a:endParaRPr/>
           </a:p>
@@ -708,7 +841,8 @@
           </a:prstGeom>
         </p:spPr>
         <p:txBody>
-          <a:bodyPr wrap="none" lIns="0" rIns="0" tIns="0" bIns="0"/>
+          <a:bodyPr wrap="none" lIns="0" tIns="0" rIns="0" bIns="0"/>
+          <a:lstStyle/>
           <a:p>
             <a:endParaRPr/>
           </a:p>
@@ -716,11 +850,14 @@
       </p:sp>
     </p:spTree>
   </p:cSld>
+  <p:clrMapOvr>
+    <a:masterClrMapping/>
+  </p:clrMapOvr>
 </p:sldLayout>
 </file>
 
 <file path=ppt/slideLayouts/slideLayout17.xml><?xml version="1.0" encoding="utf-8"?>
-<p:sldLayout xmlns:a="http://schemas.openxmlformats.org/drawingml/2006/main" xmlns:p="http://schemas.openxmlformats.org/presentationml/2006/main" xmlns:r="http://schemas.openxmlformats.org/officeDocument/2006/relationships" type="titleOnly" preserve="1">
+<p:sldLayout xmlns:a="http://schemas.openxmlformats.org/drawingml/2006/main" xmlns:r="http://schemas.openxmlformats.org/officeDocument/2006/relationships" xmlns:p="http://schemas.openxmlformats.org/presentationml/2006/main" type="titleOnly" preserve="1">
   <p:cSld name="Title Only">
     <p:spTree>
       <p:nvGrpSpPr>
@@ -756,7 +893,8 @@
           </a:prstGeom>
         </p:spPr>
         <p:txBody>
-          <a:bodyPr wrap="none" lIns="0" rIns="0" tIns="0" bIns="0" anchor="ctr"/>
+          <a:bodyPr wrap="none" lIns="0" tIns="0" rIns="0" bIns="0" anchor="ctr"/>
+          <a:lstStyle/>
           <a:p>
             <a:endParaRPr/>
           </a:p>
@@ -764,11 +902,14 @@
       </p:sp>
     </p:spTree>
   </p:cSld>
+  <p:clrMapOvr>
+    <a:masterClrMapping/>
+  </p:clrMapOvr>
 </p:sldLayout>
 </file>
 
 <file path=ppt/slideLayouts/slideLayout18.xml><?xml version="1.0" encoding="utf-8"?>
-<p:sldLayout xmlns:a="http://schemas.openxmlformats.org/drawingml/2006/main" xmlns:p="http://schemas.openxmlformats.org/presentationml/2006/main" xmlns:r="http://schemas.openxmlformats.org/officeDocument/2006/relationships" type="objOnly" preserve="1">
+<p:sldLayout xmlns:a="http://schemas.openxmlformats.org/drawingml/2006/main" xmlns:r="http://schemas.openxmlformats.org/officeDocument/2006/relationships" xmlns:p="http://schemas.openxmlformats.org/presentationml/2006/main" type="objOnly" preserve="1">
   <p:cSld name="Centered Text">
     <p:spTree>
       <p:nvGrpSpPr>
@@ -804,7 +945,8 @@
           </a:prstGeom>
         </p:spPr>
         <p:txBody>
-          <a:bodyPr wrap="none" lIns="0" rIns="0" tIns="0" bIns="0" anchor="ctr"/>
+          <a:bodyPr wrap="none" lIns="0" tIns="0" rIns="0" bIns="0" anchor="ctr"/>
+          <a:lstStyle/>
           <a:p>
             <a:pPr algn="ctr"/>
             <a:endParaRPr/>
@@ -813,11 +955,14 @@
       </p:sp>
     </p:spTree>
   </p:cSld>
+  <p:clrMapOvr>
+    <a:masterClrMapping/>
+  </p:clrMapOvr>
 </p:sldLayout>
 </file>
 
 <file path=ppt/slideLayouts/slideLayout19.xml><?xml version="1.0" encoding="utf-8"?>
-<p:sldLayout xmlns:a="http://schemas.openxmlformats.org/drawingml/2006/main" xmlns:p="http://schemas.openxmlformats.org/presentationml/2006/main" xmlns:r="http://schemas.openxmlformats.org/officeDocument/2006/relationships" type="twoObjAndObj" preserve="1">
+<p:sldLayout xmlns:a="http://schemas.openxmlformats.org/drawingml/2006/main" xmlns:r="http://schemas.openxmlformats.org/officeDocument/2006/relationships" xmlns:p="http://schemas.openxmlformats.org/presentationml/2006/main" type="twoObjAndObj" preserve="1">
   <p:cSld name="Title, 2 Content and Content">
     <p:spTree>
       <p:nvGrpSpPr>
@@ -853,7 +998,8 @@
           </a:prstGeom>
         </p:spPr>
         <p:txBody>
-          <a:bodyPr wrap="none" lIns="0" rIns="0" tIns="0" bIns="0" anchor="ctr"/>
+          <a:bodyPr wrap="none" lIns="0" tIns="0" rIns="0" bIns="0" anchor="ctr"/>
+          <a:lstStyle/>
           <a:p>
             <a:endParaRPr/>
           </a:p>
@@ -879,7 +1025,8 @@
           </a:prstGeom>
         </p:spPr>
         <p:txBody>
-          <a:bodyPr wrap="none" lIns="0" rIns="0" tIns="0" bIns="0"/>
+          <a:bodyPr wrap="none" lIns="0" tIns="0" rIns="0" bIns="0"/>
+          <a:lstStyle/>
           <a:p>
             <a:endParaRPr/>
           </a:p>
@@ -905,7 +1052,8 @@
           </a:prstGeom>
         </p:spPr>
         <p:txBody>
-          <a:bodyPr wrap="none" lIns="0" rIns="0" tIns="0" bIns="0"/>
+          <a:bodyPr wrap="none" lIns="0" tIns="0" rIns="0" bIns="0"/>
+          <a:lstStyle/>
           <a:p>
             <a:endParaRPr/>
           </a:p>
@@ -931,7 +1079,8 @@
           </a:prstGeom>
         </p:spPr>
         <p:txBody>
-          <a:bodyPr wrap="none" lIns="0" rIns="0" tIns="0" bIns="0"/>
+          <a:bodyPr wrap="none" lIns="0" tIns="0" rIns="0" bIns="0"/>
+          <a:lstStyle/>
           <a:p>
             <a:endParaRPr/>
           </a:p>
@@ -939,11 +1088,14 @@
       </p:sp>
     </p:spTree>
   </p:cSld>
+  <p:clrMapOvr>
+    <a:masterClrMapping/>
+  </p:clrMapOvr>
 </p:sldLayout>
 </file>
 
 <file path=ppt/slideLayouts/slideLayout2.xml><?xml version="1.0" encoding="utf-8"?>
-<p:sldLayout xmlns:a="http://schemas.openxmlformats.org/drawingml/2006/main" xmlns:p="http://schemas.openxmlformats.org/presentationml/2006/main" xmlns:r="http://schemas.openxmlformats.org/officeDocument/2006/relationships" type="tx" preserve="1">
+<p:sldLayout xmlns:a="http://schemas.openxmlformats.org/drawingml/2006/main" xmlns:r="http://schemas.openxmlformats.org/officeDocument/2006/relationships" xmlns:p="http://schemas.openxmlformats.org/presentationml/2006/main" type="tx" preserve="1">
   <p:cSld name="Title Slide">
     <p:spTree>
       <p:nvGrpSpPr>
@@ -979,7 +1131,8 @@
           </a:prstGeom>
         </p:spPr>
         <p:txBody>
-          <a:bodyPr wrap="none" lIns="0" rIns="0" tIns="0" bIns="0" anchor="ctr"/>
+          <a:bodyPr wrap="none" lIns="0" tIns="0" rIns="0" bIns="0" anchor="ctr"/>
+          <a:lstStyle/>
           <a:p>
             <a:endParaRPr/>
           </a:p>
@@ -1005,7 +1158,8 @@
           </a:prstGeom>
         </p:spPr>
         <p:txBody>
-          <a:bodyPr wrap="none" lIns="0" rIns="0" tIns="0" bIns="0" anchor="ctr"/>
+          <a:bodyPr wrap="none" lIns="0" tIns="0" rIns="0" bIns="0" anchor="ctr"/>
+          <a:lstStyle/>
           <a:p>
             <a:pPr algn="ctr"/>
             <a:endParaRPr/>
@@ -1014,11 +1168,14 @@
       </p:sp>
     </p:spTree>
   </p:cSld>
+  <p:clrMapOvr>
+    <a:masterClrMapping/>
+  </p:clrMapOvr>
 </p:sldLayout>
 </file>
 
 <file path=ppt/slideLayouts/slideLayout20.xml><?xml version="1.0" encoding="utf-8"?>
-<p:sldLayout xmlns:a="http://schemas.openxmlformats.org/drawingml/2006/main" xmlns:p="http://schemas.openxmlformats.org/presentationml/2006/main" xmlns:r="http://schemas.openxmlformats.org/officeDocument/2006/relationships" type="objAndTwoObj" preserve="1">
+<p:sldLayout xmlns:a="http://schemas.openxmlformats.org/drawingml/2006/main" xmlns:r="http://schemas.openxmlformats.org/officeDocument/2006/relationships" xmlns:p="http://schemas.openxmlformats.org/presentationml/2006/main" type="objAndTwoObj" preserve="1">
   <p:cSld name="Title Content and 2 Content">
     <p:spTree>
       <p:nvGrpSpPr>
@@ -1054,7 +1211,8 @@
           </a:prstGeom>
         </p:spPr>
         <p:txBody>
-          <a:bodyPr wrap="none" lIns="0" rIns="0" tIns="0" bIns="0" anchor="ctr"/>
+          <a:bodyPr wrap="none" lIns="0" tIns="0" rIns="0" bIns="0" anchor="ctr"/>
+          <a:lstStyle/>
           <a:p>
             <a:endParaRPr/>
           </a:p>
@@ -1080,7 +1238,8 @@
           </a:prstGeom>
         </p:spPr>
         <p:txBody>
-          <a:bodyPr wrap="none" lIns="0" rIns="0" tIns="0" bIns="0"/>
+          <a:bodyPr wrap="none" lIns="0" tIns="0" rIns="0" bIns="0"/>
+          <a:lstStyle/>
           <a:p>
             <a:endParaRPr/>
           </a:p>
@@ -1106,7 +1265,8 @@
           </a:prstGeom>
         </p:spPr>
         <p:txBody>
-          <a:bodyPr wrap="none" lIns="0" rIns="0" tIns="0" bIns="0"/>
+          <a:bodyPr wrap="none" lIns="0" tIns="0" rIns="0" bIns="0"/>
+          <a:lstStyle/>
           <a:p>
             <a:endParaRPr/>
           </a:p>
@@ -1132,7 +1292,8 @@
           </a:prstGeom>
         </p:spPr>
         <p:txBody>
-          <a:bodyPr wrap="none" lIns="0" rIns="0" tIns="0" bIns="0"/>
+          <a:bodyPr wrap="none" lIns="0" tIns="0" rIns="0" bIns="0"/>
+          <a:lstStyle/>
           <a:p>
             <a:endParaRPr/>
           </a:p>
@@ -1140,11 +1301,14 @@
       </p:sp>
     </p:spTree>
   </p:cSld>
+  <p:clrMapOvr>
+    <a:masterClrMapping/>
+  </p:clrMapOvr>
 </p:sldLayout>
 </file>
 
 <file path=ppt/slideLayouts/slideLayout21.xml><?xml version="1.0" encoding="utf-8"?>
-<p:sldLayout xmlns:a="http://schemas.openxmlformats.org/drawingml/2006/main" xmlns:p="http://schemas.openxmlformats.org/presentationml/2006/main" xmlns:r="http://schemas.openxmlformats.org/officeDocument/2006/relationships" type="twoObjOverTx" preserve="1">
+<p:sldLayout xmlns:a="http://schemas.openxmlformats.org/drawingml/2006/main" xmlns:r="http://schemas.openxmlformats.org/officeDocument/2006/relationships" xmlns:p="http://schemas.openxmlformats.org/presentationml/2006/main" type="twoObjOverTx" preserve="1">
   <p:cSld name="Title, 2 Content over Content">
     <p:spTree>
       <p:nvGrpSpPr>
@@ -1180,7 +1344,8 @@
           </a:prstGeom>
         </p:spPr>
         <p:txBody>
-          <a:bodyPr wrap="none" lIns="0" rIns="0" tIns="0" bIns="0" anchor="ctr"/>
+          <a:bodyPr wrap="none" lIns="0" tIns="0" rIns="0" bIns="0" anchor="ctr"/>
+          <a:lstStyle/>
           <a:p>
             <a:endParaRPr/>
           </a:p>
@@ -1206,7 +1371,8 @@
           </a:prstGeom>
         </p:spPr>
         <p:txBody>
-          <a:bodyPr wrap="none" lIns="0" rIns="0" tIns="0" bIns="0"/>
+          <a:bodyPr wrap="none" lIns="0" tIns="0" rIns="0" bIns="0"/>
+          <a:lstStyle/>
           <a:p>
             <a:endParaRPr/>
           </a:p>
@@ -1232,7 +1398,8 @@
           </a:prstGeom>
         </p:spPr>
         <p:txBody>
-          <a:bodyPr wrap="none" lIns="0" rIns="0" tIns="0" bIns="0"/>
+          <a:bodyPr wrap="none" lIns="0" tIns="0" rIns="0" bIns="0"/>
+          <a:lstStyle/>
           <a:p>
             <a:endParaRPr/>
           </a:p>
@@ -1258,7 +1425,8 @@
           </a:prstGeom>
         </p:spPr>
         <p:txBody>
-          <a:bodyPr wrap="none" lIns="0" rIns="0" tIns="0" bIns="0"/>
+          <a:bodyPr wrap="none" lIns="0" tIns="0" rIns="0" bIns="0"/>
+          <a:lstStyle/>
           <a:p>
             <a:endParaRPr/>
           </a:p>
@@ -1266,11 +1434,14 @@
       </p:sp>
     </p:spTree>
   </p:cSld>
+  <p:clrMapOvr>
+    <a:masterClrMapping/>
+  </p:clrMapOvr>
 </p:sldLayout>
 </file>
 
 <file path=ppt/slideLayouts/slideLayout22.xml><?xml version="1.0" encoding="utf-8"?>
-<p:sldLayout xmlns:a="http://schemas.openxmlformats.org/drawingml/2006/main" xmlns:p="http://schemas.openxmlformats.org/presentationml/2006/main" xmlns:r="http://schemas.openxmlformats.org/officeDocument/2006/relationships" type="objOverTx" preserve="1">
+<p:sldLayout xmlns:a="http://schemas.openxmlformats.org/drawingml/2006/main" xmlns:r="http://schemas.openxmlformats.org/officeDocument/2006/relationships" xmlns:p="http://schemas.openxmlformats.org/presentationml/2006/main" type="objOverTx" preserve="1">
   <p:cSld name="Title, Content over Content">
     <p:spTree>
       <p:nvGrpSpPr>
@@ -1306,7 +1477,8 @@
           </a:prstGeom>
         </p:spPr>
         <p:txBody>
-          <a:bodyPr wrap="none" lIns="0" rIns="0" tIns="0" bIns="0" anchor="ctr"/>
+          <a:bodyPr wrap="none" lIns="0" tIns="0" rIns="0" bIns="0" anchor="ctr"/>
+          <a:lstStyle/>
           <a:p>
             <a:endParaRPr/>
           </a:p>
@@ -1332,7 +1504,8 @@
           </a:prstGeom>
         </p:spPr>
         <p:txBody>
-          <a:bodyPr wrap="none" lIns="0" rIns="0" tIns="0" bIns="0"/>
+          <a:bodyPr wrap="none" lIns="0" tIns="0" rIns="0" bIns="0"/>
+          <a:lstStyle/>
           <a:p>
             <a:endParaRPr/>
           </a:p>
@@ -1358,7 +1531,8 @@
           </a:prstGeom>
         </p:spPr>
         <p:txBody>
-          <a:bodyPr wrap="none" lIns="0" rIns="0" tIns="0" bIns="0"/>
+          <a:bodyPr wrap="none" lIns="0" tIns="0" rIns="0" bIns="0"/>
+          <a:lstStyle/>
           <a:p>
             <a:endParaRPr/>
           </a:p>
@@ -1366,11 +1540,14 @@
       </p:sp>
     </p:spTree>
   </p:cSld>
+  <p:clrMapOvr>
+    <a:masterClrMapping/>
+  </p:clrMapOvr>
 </p:sldLayout>
 </file>
 
 <file path=ppt/slideLayouts/slideLayout23.xml><?xml version="1.0" encoding="utf-8"?>
-<p:sldLayout xmlns:a="http://schemas.openxmlformats.org/drawingml/2006/main" xmlns:p="http://schemas.openxmlformats.org/presentationml/2006/main" xmlns:r="http://schemas.openxmlformats.org/officeDocument/2006/relationships" type="fourObj" preserve="1">
+<p:sldLayout xmlns:a="http://schemas.openxmlformats.org/drawingml/2006/main" xmlns:r="http://schemas.openxmlformats.org/officeDocument/2006/relationships" xmlns:p="http://schemas.openxmlformats.org/presentationml/2006/main" type="fourObj" preserve="1">
   <p:cSld name="Title, 4 Content">
     <p:spTree>
       <p:nvGrpSpPr>
@@ -1406,7 +1583,8 @@
           </a:prstGeom>
         </p:spPr>
         <p:txBody>
-          <a:bodyPr wrap="none" lIns="0" rIns="0" tIns="0" bIns="0" anchor="ctr"/>
+          <a:bodyPr wrap="none" lIns="0" tIns="0" rIns="0" bIns="0" anchor="ctr"/>
+          <a:lstStyle/>
           <a:p>
             <a:endParaRPr/>
           </a:p>
@@ -1432,7 +1610,8 @@
           </a:prstGeom>
         </p:spPr>
         <p:txBody>
-          <a:bodyPr wrap="none" lIns="0" rIns="0" tIns="0" bIns="0"/>
+          <a:bodyPr wrap="none" lIns="0" tIns="0" rIns="0" bIns="0"/>
+          <a:lstStyle/>
           <a:p>
             <a:endParaRPr/>
           </a:p>
@@ -1458,7 +1637,8 @@
           </a:prstGeom>
         </p:spPr>
         <p:txBody>
-          <a:bodyPr wrap="none" lIns="0" rIns="0" tIns="0" bIns="0"/>
+          <a:bodyPr wrap="none" lIns="0" tIns="0" rIns="0" bIns="0"/>
+          <a:lstStyle/>
           <a:p>
             <a:endParaRPr/>
           </a:p>
@@ -1484,7 +1664,8 @@
           </a:prstGeom>
         </p:spPr>
         <p:txBody>
-          <a:bodyPr wrap="none" lIns="0" rIns="0" tIns="0" bIns="0"/>
+          <a:bodyPr wrap="none" lIns="0" tIns="0" rIns="0" bIns="0"/>
+          <a:lstStyle/>
           <a:p>
             <a:endParaRPr/>
           </a:p>
@@ -1510,7 +1691,8 @@
           </a:prstGeom>
         </p:spPr>
         <p:txBody>
-          <a:bodyPr wrap="none" lIns="0" rIns="0" tIns="0" bIns="0"/>
+          <a:bodyPr wrap="none" lIns="0" tIns="0" rIns="0" bIns="0"/>
+          <a:lstStyle/>
           <a:p>
             <a:endParaRPr/>
           </a:p>
@@ -1518,11 +1700,14 @@
       </p:sp>
     </p:spTree>
   </p:cSld>
+  <p:clrMapOvr>
+    <a:masterClrMapping/>
+  </p:clrMapOvr>
 </p:sldLayout>
 </file>
 
 <file path=ppt/slideLayouts/slideLayout24.xml><?xml version="1.0" encoding="utf-8"?>
-<p:sldLayout xmlns:a="http://schemas.openxmlformats.org/drawingml/2006/main" xmlns:p="http://schemas.openxmlformats.org/presentationml/2006/main" xmlns:r="http://schemas.openxmlformats.org/officeDocument/2006/relationships" type="blank" preserve="1">
+<p:sldLayout xmlns:a="http://schemas.openxmlformats.org/drawingml/2006/main" xmlns:r="http://schemas.openxmlformats.org/officeDocument/2006/relationships" xmlns:p="http://schemas.openxmlformats.org/presentationml/2006/main" type="blank" preserve="1">
   <p:cSld name="Title, 6 Content">
     <p:spTree>
       <p:nvGrpSpPr>
@@ -1558,7 +1743,8 @@
           </a:prstGeom>
         </p:spPr>
         <p:txBody>
-          <a:bodyPr wrap="none" lIns="0" rIns="0" tIns="0" bIns="0" anchor="ctr"/>
+          <a:bodyPr wrap="none" lIns="0" tIns="0" rIns="0" bIns="0" anchor="ctr"/>
+          <a:lstStyle/>
           <a:p>
             <a:endParaRPr/>
           </a:p>
@@ -1584,7 +1770,8 @@
           </a:prstGeom>
         </p:spPr>
         <p:txBody>
-          <a:bodyPr wrap="none" lIns="0" rIns="0" tIns="0" bIns="0"/>
+          <a:bodyPr wrap="none" lIns="0" tIns="0" rIns="0" bIns="0"/>
+          <a:lstStyle/>
           <a:p>
             <a:endParaRPr/>
           </a:p>
@@ -1610,7 +1797,8 @@
           </a:prstGeom>
         </p:spPr>
         <p:txBody>
-          <a:bodyPr wrap="none" lIns="0" rIns="0" tIns="0" bIns="0"/>
+          <a:bodyPr wrap="none" lIns="0" tIns="0" rIns="0" bIns="0"/>
+          <a:lstStyle/>
           <a:p>
             <a:endParaRPr/>
           </a:p>
@@ -1618,7 +1806,7 @@
       </p:sp>
       <p:pic>
         <p:nvPicPr>
-          <p:cNvPr id="76" name="" descr=""/>
+          <p:cNvPr id="76" name="Picture 75"/>
           <p:cNvPicPr/>
           <p:nvPr/>
         </p:nvPicPr>
@@ -1643,12 +1831,12 @@
       </p:pic>
       <p:pic>
         <p:nvPicPr>
-          <p:cNvPr id="77" name="" descr=""/>
+          <p:cNvPr id="77" name="Picture 76"/>
           <p:cNvPicPr/>
           <p:nvPr/>
         </p:nvPicPr>
         <p:blipFill>
-          <a:blip r:embed="rId3"/>
+          <a:blip r:embed="rId2"/>
           <a:stretch>
             <a:fillRect/>
           </a:stretch>
@@ -1668,11 +1856,14 @@
       </p:pic>
     </p:spTree>
   </p:cSld>
+  <p:clrMapOvr>
+    <a:masterClrMapping/>
+  </p:clrMapOvr>
 </p:sldLayout>
 </file>
 
 <file path=ppt/slideLayouts/slideLayout3.xml><?xml version="1.0" encoding="utf-8"?>
-<p:sldLayout xmlns:a="http://schemas.openxmlformats.org/drawingml/2006/main" xmlns:p="http://schemas.openxmlformats.org/presentationml/2006/main" xmlns:r="http://schemas.openxmlformats.org/officeDocument/2006/relationships" type="obj" preserve="1">
+<p:sldLayout xmlns:a="http://schemas.openxmlformats.org/drawingml/2006/main" xmlns:r="http://schemas.openxmlformats.org/officeDocument/2006/relationships" xmlns:p="http://schemas.openxmlformats.org/presentationml/2006/main" type="obj" preserve="1">
   <p:cSld name="Title, Content">
     <p:spTree>
       <p:nvGrpSpPr>
@@ -1708,7 +1899,8 @@
           </a:prstGeom>
         </p:spPr>
         <p:txBody>
-          <a:bodyPr wrap="none" lIns="0" rIns="0" tIns="0" bIns="0" anchor="ctr"/>
+          <a:bodyPr wrap="none" lIns="0" tIns="0" rIns="0" bIns="0" anchor="ctr"/>
+          <a:lstStyle/>
           <a:p>
             <a:endParaRPr/>
           </a:p>
@@ -1734,7 +1926,8 @@
           </a:prstGeom>
         </p:spPr>
         <p:txBody>
-          <a:bodyPr wrap="none" lIns="0" rIns="0" tIns="0" bIns="0"/>
+          <a:bodyPr wrap="none" lIns="0" tIns="0" rIns="0" bIns="0"/>
+          <a:lstStyle/>
           <a:p>
             <a:endParaRPr/>
           </a:p>
@@ -1742,11 +1935,14 @@
       </p:sp>
     </p:spTree>
   </p:cSld>
+  <p:clrMapOvr>
+    <a:masterClrMapping/>
+  </p:clrMapOvr>
 </p:sldLayout>
 </file>
 
 <file path=ppt/slideLayouts/slideLayout4.xml><?xml version="1.0" encoding="utf-8"?>
-<p:sldLayout xmlns:a="http://schemas.openxmlformats.org/drawingml/2006/main" xmlns:p="http://schemas.openxmlformats.org/presentationml/2006/main" xmlns:r="http://schemas.openxmlformats.org/officeDocument/2006/relationships" type="twoObj" preserve="1">
+<p:sldLayout xmlns:a="http://schemas.openxmlformats.org/drawingml/2006/main" xmlns:r="http://schemas.openxmlformats.org/officeDocument/2006/relationships" xmlns:p="http://schemas.openxmlformats.org/presentationml/2006/main" type="twoObj" preserve="1">
   <p:cSld name="Title, 2 Content">
     <p:spTree>
       <p:nvGrpSpPr>
@@ -1782,7 +1978,8 @@
           </a:prstGeom>
         </p:spPr>
         <p:txBody>
-          <a:bodyPr wrap="none" lIns="0" rIns="0" tIns="0" bIns="0" anchor="ctr"/>
+          <a:bodyPr wrap="none" lIns="0" tIns="0" rIns="0" bIns="0" anchor="ctr"/>
+          <a:lstStyle/>
           <a:p>
             <a:endParaRPr/>
           </a:p>
@@ -1808,7 +2005,8 @@
           </a:prstGeom>
         </p:spPr>
         <p:txBody>
-          <a:bodyPr wrap="none" lIns="0" rIns="0" tIns="0" bIns="0"/>
+          <a:bodyPr wrap="none" lIns="0" tIns="0" rIns="0" bIns="0"/>
+          <a:lstStyle/>
           <a:p>
             <a:endParaRPr/>
           </a:p>
@@ -1834,7 +2032,8 @@
           </a:prstGeom>
         </p:spPr>
         <p:txBody>
-          <a:bodyPr wrap="none" lIns="0" rIns="0" tIns="0" bIns="0"/>
+          <a:bodyPr wrap="none" lIns="0" tIns="0" rIns="0" bIns="0"/>
+          <a:lstStyle/>
           <a:p>
             <a:endParaRPr/>
           </a:p>
@@ -1842,11 +2041,14 @@
       </p:sp>
     </p:spTree>
   </p:cSld>
+  <p:clrMapOvr>
+    <a:masterClrMapping/>
+  </p:clrMapOvr>
 </p:sldLayout>
 </file>
 
 <file path=ppt/slideLayouts/slideLayout5.xml><?xml version="1.0" encoding="utf-8"?>
-<p:sldLayout xmlns:a="http://schemas.openxmlformats.org/drawingml/2006/main" xmlns:p="http://schemas.openxmlformats.org/presentationml/2006/main" xmlns:r="http://schemas.openxmlformats.org/officeDocument/2006/relationships" type="titleOnly" preserve="1">
+<p:sldLayout xmlns:a="http://schemas.openxmlformats.org/drawingml/2006/main" xmlns:r="http://schemas.openxmlformats.org/officeDocument/2006/relationships" xmlns:p="http://schemas.openxmlformats.org/presentationml/2006/main" type="titleOnly" preserve="1">
   <p:cSld name="Title Only">
     <p:spTree>
       <p:nvGrpSpPr>
@@ -1882,7 +2084,8 @@
           </a:prstGeom>
         </p:spPr>
         <p:txBody>
-          <a:bodyPr wrap="none" lIns="0" rIns="0" tIns="0" bIns="0" anchor="ctr"/>
+          <a:bodyPr wrap="none" lIns="0" tIns="0" rIns="0" bIns="0" anchor="ctr"/>
+          <a:lstStyle/>
           <a:p>
             <a:endParaRPr/>
           </a:p>
@@ -1890,11 +2093,14 @@
       </p:sp>
     </p:spTree>
   </p:cSld>
+  <p:clrMapOvr>
+    <a:masterClrMapping/>
+  </p:clrMapOvr>
 </p:sldLayout>
 </file>
 
 <file path=ppt/slideLayouts/slideLayout6.xml><?xml version="1.0" encoding="utf-8"?>
-<p:sldLayout xmlns:a="http://schemas.openxmlformats.org/drawingml/2006/main" xmlns:p="http://schemas.openxmlformats.org/presentationml/2006/main" xmlns:r="http://schemas.openxmlformats.org/officeDocument/2006/relationships" type="objOnly" preserve="1">
+<p:sldLayout xmlns:a="http://schemas.openxmlformats.org/drawingml/2006/main" xmlns:r="http://schemas.openxmlformats.org/officeDocument/2006/relationships" xmlns:p="http://schemas.openxmlformats.org/presentationml/2006/main" type="objOnly" preserve="1">
   <p:cSld name="Centered Text">
     <p:spTree>
       <p:nvGrpSpPr>
@@ -1930,7 +2136,8 @@
           </a:prstGeom>
         </p:spPr>
         <p:txBody>
-          <a:bodyPr wrap="none" lIns="0" rIns="0" tIns="0" bIns="0" anchor="ctr"/>
+          <a:bodyPr wrap="none" lIns="0" tIns="0" rIns="0" bIns="0" anchor="ctr"/>
+          <a:lstStyle/>
           <a:p>
             <a:pPr algn="ctr"/>
             <a:endParaRPr/>
@@ -1939,11 +2146,14 @@
       </p:sp>
     </p:spTree>
   </p:cSld>
+  <p:clrMapOvr>
+    <a:masterClrMapping/>
+  </p:clrMapOvr>
 </p:sldLayout>
 </file>
 
 <file path=ppt/slideLayouts/slideLayout7.xml><?xml version="1.0" encoding="utf-8"?>
-<p:sldLayout xmlns:a="http://schemas.openxmlformats.org/drawingml/2006/main" xmlns:p="http://schemas.openxmlformats.org/presentationml/2006/main" xmlns:r="http://schemas.openxmlformats.org/officeDocument/2006/relationships" type="twoObjAndObj" preserve="1">
+<p:sldLayout xmlns:a="http://schemas.openxmlformats.org/drawingml/2006/main" xmlns:r="http://schemas.openxmlformats.org/officeDocument/2006/relationships" xmlns:p="http://schemas.openxmlformats.org/presentationml/2006/main" type="twoObjAndObj" preserve="1">
   <p:cSld name="Title, 2 Content and Content">
     <p:spTree>
       <p:nvGrpSpPr>
@@ -1979,7 +2189,8 @@
           </a:prstGeom>
         </p:spPr>
         <p:txBody>
-          <a:bodyPr wrap="none" lIns="0" rIns="0" tIns="0" bIns="0" anchor="ctr"/>
+          <a:bodyPr wrap="none" lIns="0" tIns="0" rIns="0" bIns="0" anchor="ctr"/>
+          <a:lstStyle/>
           <a:p>
             <a:endParaRPr/>
           </a:p>
@@ -2005,7 +2216,8 @@
           </a:prstGeom>
         </p:spPr>
         <p:txBody>
-          <a:bodyPr wrap="none" lIns="0" rIns="0" tIns="0" bIns="0"/>
+          <a:bodyPr wrap="none" lIns="0" tIns="0" rIns="0" bIns="0"/>
+          <a:lstStyle/>
           <a:p>
             <a:endParaRPr/>
           </a:p>
@@ -2031,7 +2243,8 @@
           </a:prstGeom>
         </p:spPr>
         <p:txBody>
-          <a:bodyPr wrap="none" lIns="0" rIns="0" tIns="0" bIns="0"/>
+          <a:bodyPr wrap="none" lIns="0" tIns="0" rIns="0" bIns="0"/>
+          <a:lstStyle/>
           <a:p>
             <a:endParaRPr/>
           </a:p>
@@ -2057,7 +2270,8 @@
           </a:prstGeom>
         </p:spPr>
         <p:txBody>
-          <a:bodyPr wrap="none" lIns="0" rIns="0" tIns="0" bIns="0"/>
+          <a:bodyPr wrap="none" lIns="0" tIns="0" rIns="0" bIns="0"/>
+          <a:lstStyle/>
           <a:p>
             <a:endParaRPr/>
           </a:p>
@@ -2065,11 +2279,14 @@
       </p:sp>
     </p:spTree>
   </p:cSld>
+  <p:clrMapOvr>
+    <a:masterClrMapping/>
+  </p:clrMapOvr>
 </p:sldLayout>
 </file>
 
 <file path=ppt/slideLayouts/slideLayout8.xml><?xml version="1.0" encoding="utf-8"?>
-<p:sldLayout xmlns:a="http://schemas.openxmlformats.org/drawingml/2006/main" xmlns:p="http://schemas.openxmlformats.org/presentationml/2006/main" xmlns:r="http://schemas.openxmlformats.org/officeDocument/2006/relationships" type="objAndTwoObj" preserve="1">
+<p:sldLayout xmlns:a="http://schemas.openxmlformats.org/drawingml/2006/main" xmlns:r="http://schemas.openxmlformats.org/officeDocument/2006/relationships" xmlns:p="http://schemas.openxmlformats.org/presentationml/2006/main" type="objAndTwoObj" preserve="1">
   <p:cSld name="Title Content and 2 Content">
     <p:spTree>
       <p:nvGrpSpPr>
@@ -2105,7 +2322,8 @@
           </a:prstGeom>
         </p:spPr>
         <p:txBody>
-          <a:bodyPr wrap="none" lIns="0" rIns="0" tIns="0" bIns="0" anchor="ctr"/>
+          <a:bodyPr wrap="none" lIns="0" tIns="0" rIns="0" bIns="0" anchor="ctr"/>
+          <a:lstStyle/>
           <a:p>
             <a:endParaRPr/>
           </a:p>
@@ -2131,7 +2349,8 @@
           </a:prstGeom>
         </p:spPr>
         <p:txBody>
-          <a:bodyPr wrap="none" lIns="0" rIns="0" tIns="0" bIns="0"/>
+          <a:bodyPr wrap="none" lIns="0" tIns="0" rIns="0" bIns="0"/>
+          <a:lstStyle/>
           <a:p>
             <a:endParaRPr/>
           </a:p>
@@ -2157,7 +2376,8 @@
           </a:prstGeom>
         </p:spPr>
         <p:txBody>
-          <a:bodyPr wrap="none" lIns="0" rIns="0" tIns="0" bIns="0"/>
+          <a:bodyPr wrap="none" lIns="0" tIns="0" rIns="0" bIns="0"/>
+          <a:lstStyle/>
           <a:p>
             <a:endParaRPr/>
           </a:p>
@@ -2183,7 +2403,8 @@
           </a:prstGeom>
         </p:spPr>
         <p:txBody>
-          <a:bodyPr wrap="none" lIns="0" rIns="0" tIns="0" bIns="0"/>
+          <a:bodyPr wrap="none" lIns="0" tIns="0" rIns="0" bIns="0"/>
+          <a:lstStyle/>
           <a:p>
             <a:endParaRPr/>
           </a:p>
@@ -2191,11 +2412,14 @@
       </p:sp>
     </p:spTree>
   </p:cSld>
+  <p:clrMapOvr>
+    <a:masterClrMapping/>
+  </p:clrMapOvr>
 </p:sldLayout>
 </file>
 
 <file path=ppt/slideLayouts/slideLayout9.xml><?xml version="1.0" encoding="utf-8"?>
-<p:sldLayout xmlns:a="http://schemas.openxmlformats.org/drawingml/2006/main" xmlns:p="http://schemas.openxmlformats.org/presentationml/2006/main" xmlns:r="http://schemas.openxmlformats.org/officeDocument/2006/relationships" type="twoObjOverTx" preserve="1">
+<p:sldLayout xmlns:a="http://schemas.openxmlformats.org/drawingml/2006/main" xmlns:r="http://schemas.openxmlformats.org/officeDocument/2006/relationships" xmlns:p="http://schemas.openxmlformats.org/presentationml/2006/main" type="twoObjOverTx" preserve="1">
   <p:cSld name="Title, 2 Content over Content">
     <p:spTree>
       <p:nvGrpSpPr>
@@ -2231,7 +2455,8 @@
           </a:prstGeom>
         </p:spPr>
         <p:txBody>
-          <a:bodyPr wrap="none" lIns="0" rIns="0" tIns="0" bIns="0" anchor="ctr"/>
+          <a:bodyPr wrap="none" lIns="0" tIns="0" rIns="0" bIns="0" anchor="ctr"/>
+          <a:lstStyle/>
           <a:p>
             <a:endParaRPr/>
           </a:p>
@@ -2257,7 +2482,8 @@
           </a:prstGeom>
         </p:spPr>
         <p:txBody>
-          <a:bodyPr wrap="none" lIns="0" rIns="0" tIns="0" bIns="0"/>
+          <a:bodyPr wrap="none" lIns="0" tIns="0" rIns="0" bIns="0"/>
+          <a:lstStyle/>
           <a:p>
             <a:endParaRPr/>
           </a:p>
@@ -2283,7 +2509,8 @@
           </a:prstGeom>
         </p:spPr>
         <p:txBody>
-          <a:bodyPr wrap="none" lIns="0" rIns="0" tIns="0" bIns="0"/>
+          <a:bodyPr wrap="none" lIns="0" tIns="0" rIns="0" bIns="0"/>
+          <a:lstStyle/>
           <a:p>
             <a:endParaRPr/>
           </a:p>
@@ -2309,7 +2536,8 @@
           </a:prstGeom>
         </p:spPr>
         <p:txBody>
-          <a:bodyPr wrap="none" lIns="0" rIns="0" tIns="0" bIns="0"/>
+          <a:bodyPr wrap="none" lIns="0" tIns="0" rIns="0" bIns="0"/>
+          <a:lstStyle/>
           <a:p>
             <a:endParaRPr/>
           </a:p>
@@ -2317,17 +2545,21 @@
       </p:sp>
     </p:spTree>
   </p:cSld>
+  <p:clrMapOvr>
+    <a:masterClrMapping/>
+  </p:clrMapOvr>
 </p:sldLayout>
 </file>
 
 <file path=ppt/slideMasters/slideMaster1.xml><?xml version="1.0" encoding="utf-8"?>
-<p:sldMaster xmlns:a="http://schemas.openxmlformats.org/drawingml/2006/main" xmlns:p="http://schemas.openxmlformats.org/presentationml/2006/main" xmlns:r="http://schemas.openxmlformats.org/officeDocument/2006/relationships">
+<p:sldMaster xmlns:a="http://schemas.openxmlformats.org/drawingml/2006/main" xmlns:r="http://schemas.openxmlformats.org/officeDocument/2006/relationships" xmlns:p="http://schemas.openxmlformats.org/presentationml/2006/main">
   <p:cSld>
     <p:bg>
       <p:bgPr>
         <a:solidFill>
-          <a:srgbClr val="ffffff"/>
+          <a:srgbClr val="FFFFFF"/>
         </a:solidFill>
+        <a:effectLst/>
       </p:bgPr>
     </p:bg>
     <p:spTree>
@@ -2346,7 +2578,7 @@
       </p:grpSpPr>
       <p:sp>
         <p:nvSpPr>
-          <p:cNvPr id="0" name="PlaceHolder 1"/>
+          <p:cNvPr id="5" name="PlaceHolder 1"/>
           <p:cNvSpPr>
             <a:spLocks noGrp="1"/>
           </p:cNvSpPr>
@@ -2365,6 +2597,7 @@
         </p:spPr>
         <p:txBody>
           <a:bodyPr anchor="ctr"/>
+          <a:lstStyle/>
           <a:p>
             <a:pPr algn="ctr">
               <a:lnSpc>
@@ -2386,7 +2619,7 @@
       </p:sp>
       <p:sp>
         <p:nvSpPr>
-          <p:cNvPr id="1" name="PlaceHolder 2"/>
+          <p:cNvPr id="6" name="PlaceHolder 2"/>
           <p:cNvSpPr>
             <a:spLocks noGrp="1"/>
           </p:cNvSpPr>
@@ -2405,6 +2638,7 @@
         </p:spPr>
         <p:txBody>
           <a:bodyPr anchor="ctr"/>
+          <a:lstStyle/>
           <a:p>
             <a:pPr>
               <a:lnSpc>
@@ -2414,7 +2648,7 @@
             <a:r>
               <a:rPr lang="en-US" sz="1200">
                 <a:solidFill>
-                  <a:srgbClr val="8b8b8b"/>
+                  <a:srgbClr val="8B8B8B"/>
                 </a:solidFill>
                 <a:latin typeface="Calibri"/>
               </a:rPr>
@@ -2445,6 +2679,7 @@
         </p:spPr>
         <p:txBody>
           <a:bodyPr anchor="ctr"/>
+          <a:lstStyle/>
           <a:p>
             <a:endParaRPr/>
           </a:p>
@@ -2471,6 +2706,7 @@
         </p:spPr>
         <p:txBody>
           <a:bodyPr anchor="ctr"/>
+          <a:lstStyle/>
           <a:p>
             <a:pPr algn="r">
               <a:lnSpc>
@@ -2480,11 +2716,11 @@
             <a:fld id="{17EB0864-61F8-4BE8-AE65-E9001DDF2FF8}" type="slidenum">
               <a:rPr lang="en-US" sz="1200">
                 <a:solidFill>
-                  <a:srgbClr val="8b8b8b"/>
-                </a:solidFill>
-                <a:latin typeface="Calibri"/>
-              </a:rPr>
-              <a:t>&lt;number&gt;</a:t>
+                  <a:srgbClr val="8B8B8B"/>
+                </a:solidFill>
+                <a:latin typeface="Calibri"/>
+              </a:rPr>
+              <a:t>‹#›</a:t>
             </a:fld>
             <a:endParaRPr/>
           </a:p>
@@ -2510,7 +2746,8 @@
           </a:prstGeom>
         </p:spPr>
         <p:txBody>
-          <a:bodyPr wrap="none" lIns="0" rIns="0" tIns="0" bIns="0"/>
+          <a:bodyPr wrap="none" lIns="0" tIns="0" rIns="0" bIns="0"/>
+          <a:lstStyle/>
           <a:p>
             <a:pPr>
               <a:buSzPct val="25000"/>
@@ -2599,32 +2836,38 @@
       </p:sp>
     </p:spTree>
   </p:cSld>
-  <p:clrMap bg1="lt1" bg2="lt2" tx1="dk1" tx2="dk2" accent1="accent1" accent2="accent2" accent3="accent3" accent4="accent4" accent5="accent5" accent6="accent6" hlink="hlink" folHlink="folHlink"/>
+  <p:clrMap bg1="lt1" tx1="dk1" bg2="lt2" tx2="dk2" accent1="accent1" accent2="accent2" accent3="accent3" accent4="accent4" accent5="accent5" accent6="accent6" hlink="hlink" folHlink="folHlink"/>
   <p:sldLayoutIdLst>
-    <p:sldLayoutId id="2147483649" r:id="rId2"/>
-    <p:sldLayoutId id="2147483650" r:id="rId3"/>
-    <p:sldLayoutId id="2147483651" r:id="rId4"/>
-    <p:sldLayoutId id="2147483652" r:id="rId5"/>
-    <p:sldLayoutId id="2147483653" r:id="rId6"/>
-    <p:sldLayoutId id="2147483654" r:id="rId7"/>
-    <p:sldLayoutId id="2147483655" r:id="rId8"/>
-    <p:sldLayoutId id="2147483656" r:id="rId9"/>
-    <p:sldLayoutId id="2147483657" r:id="rId10"/>
-    <p:sldLayoutId id="2147483658" r:id="rId11"/>
-    <p:sldLayoutId id="2147483659" r:id="rId12"/>
-    <p:sldLayoutId id="2147483660" r:id="rId13"/>
+    <p:sldLayoutId id="2147483649" r:id="rId1"/>
+    <p:sldLayoutId id="2147483650" r:id="rId2"/>
+    <p:sldLayoutId id="2147483651" r:id="rId3"/>
+    <p:sldLayoutId id="2147483652" r:id="rId4"/>
+    <p:sldLayoutId id="2147483653" r:id="rId5"/>
+    <p:sldLayoutId id="2147483654" r:id="rId6"/>
+    <p:sldLayoutId id="2147483655" r:id="rId7"/>
+    <p:sldLayoutId id="2147483656" r:id="rId8"/>
+    <p:sldLayoutId id="2147483657" r:id="rId9"/>
+    <p:sldLayoutId id="2147483658" r:id="rId10"/>
+    <p:sldLayoutId id="2147483659" r:id="rId11"/>
+    <p:sldLayoutId id="2147483660" r:id="rId12"/>
   </p:sldLayoutIdLst>
+  <p:txStyles>
+    <p:titleStyle/>
+    <p:bodyStyle/>
+    <p:otherStyle/>
+  </p:txStyles>
 </p:sldMaster>
 </file>
 
 <file path=ppt/slideMasters/slideMaster2.xml><?xml version="1.0" encoding="utf-8"?>
-<p:sldMaster xmlns:a="http://schemas.openxmlformats.org/drawingml/2006/main" xmlns:p="http://schemas.openxmlformats.org/presentationml/2006/main" xmlns:r="http://schemas.openxmlformats.org/officeDocument/2006/relationships">
+<p:sldMaster xmlns:a="http://schemas.openxmlformats.org/drawingml/2006/main" xmlns:r="http://schemas.openxmlformats.org/officeDocument/2006/relationships" xmlns:p="http://schemas.openxmlformats.org/presentationml/2006/main">
   <p:cSld>
     <p:bg>
       <p:bgPr>
         <a:solidFill>
-          <a:srgbClr val="ffffff"/>
+          <a:srgbClr val="FFFFFF"/>
         </a:solidFill>
+        <a:effectLst/>
       </p:bgPr>
     </p:bg>
     <p:spTree>
@@ -2662,6 +2905,7 @@
         </p:spPr>
         <p:txBody>
           <a:bodyPr anchor="ctr"/>
+          <a:lstStyle/>
           <a:p>
             <a:pPr algn="ctr">
               <a:lnSpc>
@@ -2702,6 +2946,7 @@
         </p:spPr>
         <p:txBody>
           <a:bodyPr/>
+          <a:lstStyle/>
           <a:p>
             <a:pPr>
               <a:buSzPct val="25000"/>
@@ -2922,6 +3167,7 @@
         </p:spPr>
         <p:txBody>
           <a:bodyPr anchor="ctr"/>
+          <a:lstStyle/>
           <a:p>
             <a:pPr>
               <a:lnSpc>
@@ -2931,7 +3177,7 @@
             <a:r>
               <a:rPr lang="en-US" sz="1200">
                 <a:solidFill>
-                  <a:srgbClr val="8b8b8b"/>
+                  <a:srgbClr val="8B8B8B"/>
                 </a:solidFill>
                 <a:latin typeface="Calibri"/>
               </a:rPr>
@@ -2962,6 +3208,7 @@
         </p:spPr>
         <p:txBody>
           <a:bodyPr anchor="ctr"/>
+          <a:lstStyle/>
           <a:p>
             <a:endParaRPr/>
           </a:p>
@@ -2988,6 +3235,7 @@
         </p:spPr>
         <p:txBody>
           <a:bodyPr anchor="ctr"/>
+          <a:lstStyle/>
           <a:p>
             <a:pPr algn="r">
               <a:lnSpc>
@@ -2997,11 +3245,11 @@
             <a:fld id="{300CB958-0A91-40C0-85F8-4CF9BD8B0173}" type="slidenum">
               <a:rPr lang="en-US" sz="1200">
                 <a:solidFill>
-                  <a:srgbClr val="8b8b8b"/>
-                </a:solidFill>
-                <a:latin typeface="Calibri"/>
-              </a:rPr>
-              <a:t>&lt;number&gt;</a:t>
+                  <a:srgbClr val="8B8B8B"/>
+                </a:solidFill>
+                <a:latin typeface="Calibri"/>
+              </a:rPr>
+              <a:t>‹#›</a:t>
             </a:fld>
             <a:endParaRPr/>
           </a:p>
@@ -3009,26 +3257,31 @@
       </p:sp>
     </p:spTree>
   </p:cSld>
-  <p:clrMap bg1="lt1" bg2="lt2" tx1="dk1" tx2="dk2" accent1="accent1" accent2="accent2" accent3="accent3" accent4="accent4" accent5="accent5" accent6="accent6" hlink="hlink" folHlink="folHlink"/>
+  <p:clrMap bg1="lt1" tx1="dk1" bg2="lt2" tx2="dk2" accent1="accent1" accent2="accent2" accent3="accent3" accent4="accent4" accent5="accent5" accent6="accent6" hlink="hlink" folHlink="folHlink"/>
   <p:sldLayoutIdLst>
-    <p:sldLayoutId id="2147483662" r:id="rId2"/>
-    <p:sldLayoutId id="2147483663" r:id="rId3"/>
-    <p:sldLayoutId id="2147483664" r:id="rId4"/>
-    <p:sldLayoutId id="2147483665" r:id="rId5"/>
-    <p:sldLayoutId id="2147483666" r:id="rId6"/>
-    <p:sldLayoutId id="2147483667" r:id="rId7"/>
-    <p:sldLayoutId id="2147483668" r:id="rId8"/>
-    <p:sldLayoutId id="2147483669" r:id="rId9"/>
-    <p:sldLayoutId id="2147483670" r:id="rId10"/>
-    <p:sldLayoutId id="2147483671" r:id="rId11"/>
-    <p:sldLayoutId id="2147483672" r:id="rId12"/>
-    <p:sldLayoutId id="2147483673" r:id="rId13"/>
+    <p:sldLayoutId id="2147483662" r:id="rId1"/>
+    <p:sldLayoutId id="2147483663" r:id="rId2"/>
+    <p:sldLayoutId id="2147483664" r:id="rId3"/>
+    <p:sldLayoutId id="2147483665" r:id="rId4"/>
+    <p:sldLayoutId id="2147483666" r:id="rId5"/>
+    <p:sldLayoutId id="2147483667" r:id="rId6"/>
+    <p:sldLayoutId id="2147483668" r:id="rId7"/>
+    <p:sldLayoutId id="2147483669" r:id="rId8"/>
+    <p:sldLayoutId id="2147483670" r:id="rId9"/>
+    <p:sldLayoutId id="2147483671" r:id="rId10"/>
+    <p:sldLayoutId id="2147483672" r:id="rId11"/>
+    <p:sldLayoutId id="2147483673" r:id="rId12"/>
   </p:sldLayoutIdLst>
+  <p:txStyles>
+    <p:titleStyle/>
+    <p:bodyStyle/>
+    <p:otherStyle/>
+  </p:txStyles>
 </p:sldMaster>
 </file>
 
 <file path=ppt/slides/slide1.xml><?xml version="1.0" encoding="utf-8"?>
-<p:sld xmlns:a="http://schemas.openxmlformats.org/drawingml/2006/main" xmlns:p="http://schemas.openxmlformats.org/presentationml/2006/main" xmlns:r="http://schemas.openxmlformats.org/officeDocument/2006/relationships">
+<p:sld xmlns:a="http://schemas.openxmlformats.org/drawingml/2006/main" xmlns:r="http://schemas.openxmlformats.org/officeDocument/2006/relationships" xmlns:p="http://schemas.openxmlformats.org/presentationml/2006/main">
   <p:cSld>
     <p:spTree>
       <p:nvGrpSpPr>
@@ -3061,6 +3314,7 @@
         </p:spPr>
         <p:txBody>
           <a:bodyPr anchor="ctr"/>
+          <a:lstStyle/>
           <a:p>
             <a:pPr algn="ctr">
               <a:lnSpc>
@@ -3068,7 +3322,7 @@
               </a:lnSpc>
             </a:pPr>
             <a:r>
-              <a:rPr i="1" lang="en-US" sz="4400">
+              <a:rPr lang="en-US" sz="4400" i="1">
                 <a:solidFill>
                   <a:srgbClr val="000000"/>
                 </a:solidFill>
@@ -3106,6 +3360,7 @@
         </p:spPr>
         <p:txBody>
           <a:bodyPr/>
+          <a:lstStyle/>
           <a:p>
             <a:pPr algn="ctr">
               <a:lnSpc>
@@ -3115,7 +3370,7 @@
             <a:r>
               <a:rPr lang="en-US" sz="3200">
                 <a:solidFill>
-                  <a:srgbClr val="8b8b8b"/>
+                  <a:srgbClr val="8B8B8B"/>
                 </a:solidFill>
                 <a:latin typeface="Calibri"/>
               </a:rPr>
@@ -3132,7 +3387,7 @@
             <a:r>
               <a:rPr lang="en-US" sz="3200">
                 <a:solidFill>
-                  <a:srgbClr val="8b8b8b"/>
+                  <a:srgbClr val="8B8B8B"/>
                 </a:solidFill>
                 <a:latin typeface="Calibri"/>
               </a:rPr>
@@ -3144,22 +3399,25 @@
       </p:sp>
     </p:spTree>
   </p:cSld>
+  <p:clrMapOvr>
+    <a:masterClrMapping/>
+  </p:clrMapOvr>
   <p:timing>
     <p:tnLst>
       <p:par>
-        <p:cTn id="1" dur="indefinite" restart="never" nodeType="tmRoot">
+        <p:cTn xmlns:p14="http://schemas.microsoft.com/office/powerpoint/2010/main" id="1" dur="indefinite" restart="never" nodeType="tmRoot">
           <p:childTnLst>
             <p:seq>
               <p:cTn id="2" nodeType="mainSeq"/>
               <p:prevCondLst>
-                <p:cond delay="0" evt="onPrev">
+                <p:cond evt="onPrev" delay="0">
                   <p:tgtEl>
                     <p:sldTgt/>
                   </p:tgtEl>
                 </p:cond>
               </p:prevCondLst>
               <p:nextCondLst>
-                <p:cond delay="0" evt="onNext">
+                <p:cond evt="onNext" delay="0">
                   <p:tgtEl>
                     <p:sldTgt/>
                   </p:tgtEl>
@@ -3175,7 +3433,7 @@
 </file>
 
 <file path=ppt/slides/slide10.xml><?xml version="1.0" encoding="utf-8"?>
-<p:sld xmlns:a="http://schemas.openxmlformats.org/drawingml/2006/main" xmlns:p="http://schemas.openxmlformats.org/presentationml/2006/main" xmlns:r="http://schemas.openxmlformats.org/officeDocument/2006/relationships">
+<p:sld xmlns:a="http://schemas.openxmlformats.org/drawingml/2006/main" xmlns:r="http://schemas.openxmlformats.org/officeDocument/2006/relationships" xmlns:p="http://schemas.openxmlformats.org/presentationml/2006/main">
   <p:cSld>
     <p:spTree>
       <p:nvGrpSpPr>
@@ -3208,6 +3466,7 @@
         </p:spPr>
         <p:txBody>
           <a:bodyPr anchor="ctr"/>
+          <a:lstStyle/>
           <a:p>
             <a:pPr algn="ctr">
               <a:lnSpc>
@@ -3229,137 +3488,215 @@
       </p:sp>
       <p:sp>
         <p:nvSpPr>
-          <p:cNvPr id="116" name="TextShape 2"/>
-          <p:cNvSpPr txBox="1"/>
-          <p:nvPr/>
-        </p:nvSpPr>
-        <p:spPr>
-          <a:xfrm>
-            <a:off x="457200" y="1600200"/>
-            <a:ext cx="8229240" cy="4525560"/>
-          </a:xfrm>
-          <a:prstGeom prst="rect">
-            <a:avLst/>
-          </a:prstGeom>
-        </p:spPr>
+          <p:cNvPr id="3" name="Text Placeholder 2"/>
+          <p:cNvSpPr>
+            <a:spLocks noGrp="1"/>
+          </p:cNvSpPr>
+          <p:nvPr>
+            <p:ph type="body"/>
+          </p:nvPr>
+        </p:nvSpPr>
+        <p:spPr/>
         <p:txBody>
           <a:bodyPr/>
-          <a:p>
-            <a:pPr>
-              <a:buSzPct val="25000"/>
-              <a:buFont typeface="StarSymbol"/>
-              <a:buChar char=""/>
-            </a:pPr>
-            <a:r>
-              <a:rPr lang="en-US"/>
-              <a:t>DBLP Dataset</a:t>
-            </a:r>
-            <a:endParaRPr/>
-          </a:p>
-          <a:p>
-            <a:pPr lvl="1">
-              <a:buSzPct val="25000"/>
-              <a:buFont typeface="StarSymbol"/>
-              <a:buChar char=""/>
-            </a:pPr>
-            <a:r>
-              <a:rPr lang="en-US"/>
-              <a:t>70k vertices</a:t>
-            </a:r>
-            <a:endParaRPr/>
-          </a:p>
-          <a:p>
-            <a:pPr lvl="1">
-              <a:buSzPct val="25000"/>
-              <a:buFont typeface="StarSymbol"/>
-              <a:buChar char=""/>
-            </a:pPr>
-            <a:r>
-              <a:rPr lang="en-US"/>
-              <a:t>Degree of node average: 9.0, std: 74.8</a:t>
-            </a:r>
-            <a:endParaRPr/>
-          </a:p>
-          <a:p>
-            <a:pPr lvl="1">
-              <a:buSzPct val="25000"/>
-              <a:buFont typeface="StarSymbol"/>
-              <a:buChar char=""/>
-            </a:pPr>
-            <a:r>
-              <a:rPr lang="en-US"/>
-              <a:t>Path length average: 4.0, std: 1.10</a:t>
-            </a:r>
-            <a:endParaRPr/>
-          </a:p>
-          <a:p>
-            <a:pPr>
-              <a:buSzPct val="25000"/>
-              <a:buFont typeface="StarSymbol"/>
-              <a:buChar char=""/>
-            </a:pPr>
-            <a:r>
-              <a:rPr lang="en-US"/>
-              <a:t>NYTimes News Dataset</a:t>
-            </a:r>
-            <a:endParaRPr/>
-          </a:p>
-          <a:p>
-            <a:pPr lvl="1">
-              <a:buSzPct val="25000"/>
-              <a:buFont typeface="StarSymbol"/>
-              <a:buChar char=""/>
-            </a:pPr>
-            <a:r>
-              <a:rPr lang="en-US"/>
-              <a:t>180k vertices</a:t>
-            </a:r>
-            <a:endParaRPr/>
-          </a:p>
-          <a:p>
-            <a:pPr lvl="1">
-              <a:buSzPct val="25000"/>
-              <a:buFont typeface="StarSymbol"/>
-              <a:buChar char=""/>
-            </a:pPr>
-            <a:r>
-              <a:rPr lang="en-US"/>
-              <a:t>Degree of node average: 10.0, std: 73.7</a:t>
-            </a:r>
-            <a:endParaRPr/>
-          </a:p>
-          <a:p>
-            <a:pPr lvl="1">
-              <a:buSzPct val="25000"/>
-              <a:buFont typeface="StarSymbol"/>
-              <a:buChar char=""/>
-            </a:pPr>
-            <a:r>
-              <a:rPr lang="en-US"/>
-              <a:t>Path length average: 4, std: 0.972714</a:t>
-            </a:r>
-            <a:endParaRPr/>
+          <a:lstStyle/>
+          <a:p>
+            <a:pPr marL="457200" indent="-457200">
+              <a:buFont typeface="Arial"/>
+              <a:buChar char="•"/>
+            </a:pPr>
+            <a:r>
+              <a:rPr lang="en-US" sz="3200" dirty="0" smtClean="0">
+                <a:latin typeface="Calibri"/>
+                <a:cs typeface="Calibri"/>
+              </a:rPr>
+              <a:t>DBLP Dataset:</a:t>
+            </a:r>
+            <a:r>
+              <a:rPr lang="en-US" sz="3200" dirty="0">
+                <a:latin typeface="Calibri"/>
+                <a:cs typeface="Calibri"/>
+              </a:rPr>
+              <a:t/>
+            </a:r>
+            <a:br>
+              <a:rPr lang="en-US" sz="3200" dirty="0">
+                <a:latin typeface="Calibri"/>
+                <a:cs typeface="Calibri"/>
+              </a:rPr>
+            </a:br>
+            <a:r>
+              <a:rPr lang="en-US" sz="3200" dirty="0" smtClean="0">
+                <a:latin typeface="Calibri"/>
+                <a:cs typeface="Calibri"/>
+              </a:rPr>
+              <a:t>	- 70,000+ vertices</a:t>
+            </a:r>
+            <a:br>
+              <a:rPr lang="en-US" sz="3200" dirty="0" smtClean="0">
+                <a:latin typeface="Calibri"/>
+                <a:cs typeface="Calibri"/>
+              </a:rPr>
+            </a:br>
+            <a:r>
+              <a:rPr lang="en-US" sz="3200" dirty="0" smtClean="0">
+                <a:latin typeface="Calibri"/>
+                <a:cs typeface="Calibri"/>
+              </a:rPr>
+              <a:t>	- Average degree: 9.0, </a:t>
+            </a:r>
+            <a:r>
+              <a:rPr lang="en-US" sz="3200" dirty="0" err="1" smtClean="0">
+                <a:latin typeface="Calibri"/>
+                <a:cs typeface="Calibri"/>
+              </a:rPr>
+              <a:t>std</a:t>
+            </a:r>
+            <a:r>
+              <a:rPr lang="en-US" sz="3200" dirty="0" smtClean="0">
+                <a:latin typeface="Calibri"/>
+                <a:cs typeface="Calibri"/>
+              </a:rPr>
+              <a:t>: 74.8</a:t>
+            </a:r>
+            <a:br>
+              <a:rPr lang="en-US" sz="3200" dirty="0" smtClean="0">
+                <a:latin typeface="Calibri"/>
+                <a:cs typeface="Calibri"/>
+              </a:rPr>
+            </a:br>
+            <a:r>
+              <a:rPr lang="en-US" sz="3200" dirty="0" smtClean="0">
+                <a:latin typeface="Calibri"/>
+                <a:cs typeface="Calibri"/>
+              </a:rPr>
+              <a:t>	- Average path length: 4.0, </a:t>
+            </a:r>
+            <a:r>
+              <a:rPr lang="en-US" sz="3200" dirty="0" err="1" smtClean="0">
+                <a:latin typeface="Calibri"/>
+                <a:cs typeface="Calibri"/>
+              </a:rPr>
+              <a:t>std</a:t>
+            </a:r>
+            <a:r>
+              <a:rPr lang="en-US" sz="3200" dirty="0" smtClean="0">
+                <a:latin typeface="Calibri"/>
+                <a:cs typeface="Calibri"/>
+              </a:rPr>
+              <a:t>: 1.1</a:t>
+            </a:r>
+          </a:p>
+          <a:p>
+            <a:pPr marL="457200" indent="-457200">
+              <a:buFont typeface="Arial"/>
+              <a:buChar char="•"/>
+            </a:pPr>
+            <a:r>
+              <a:rPr lang="en-US" sz="3200" dirty="0" err="1" smtClean="0">
+                <a:latin typeface="Calibri"/>
+                <a:cs typeface="Calibri"/>
+              </a:rPr>
+              <a:t>NYTimes</a:t>
+            </a:r>
+            <a:r>
+              <a:rPr lang="en-US" sz="3200" dirty="0" smtClean="0">
+                <a:latin typeface="Calibri"/>
+                <a:cs typeface="Calibri"/>
+              </a:rPr>
+              <a:t> News Dataset:</a:t>
+            </a:r>
+            <a:br>
+              <a:rPr lang="en-US" sz="3200" dirty="0" smtClean="0">
+                <a:latin typeface="Calibri"/>
+                <a:cs typeface="Calibri"/>
+              </a:rPr>
+            </a:br>
+            <a:r>
+              <a:rPr lang="en-US" sz="3200" dirty="0" smtClean="0">
+                <a:latin typeface="Calibri"/>
+                <a:cs typeface="Calibri"/>
+              </a:rPr>
+              <a:t>	- 180,000+ vertices</a:t>
+            </a:r>
+            <a:br>
+              <a:rPr lang="en-US" sz="3200" dirty="0" smtClean="0">
+                <a:latin typeface="Calibri"/>
+                <a:cs typeface="Calibri"/>
+              </a:rPr>
+            </a:br>
+            <a:r>
+              <a:rPr lang="en-US" sz="3200" dirty="0" smtClean="0">
+                <a:latin typeface="Calibri"/>
+                <a:cs typeface="Calibri"/>
+              </a:rPr>
+              <a:t>	- Average degree: 10.0, </a:t>
+            </a:r>
+            <a:r>
+              <a:rPr lang="en-US" sz="3200" dirty="0" err="1" smtClean="0">
+                <a:latin typeface="Calibri"/>
+                <a:cs typeface="Calibri"/>
+              </a:rPr>
+              <a:t>std</a:t>
+            </a:r>
+            <a:r>
+              <a:rPr lang="en-US" sz="3200" dirty="0" smtClean="0">
+                <a:latin typeface="Calibri"/>
+                <a:cs typeface="Calibri"/>
+              </a:rPr>
+              <a:t>: 73.7</a:t>
+            </a:r>
+            <a:br>
+              <a:rPr lang="en-US" sz="3200" dirty="0" smtClean="0">
+                <a:latin typeface="Calibri"/>
+                <a:cs typeface="Calibri"/>
+              </a:rPr>
+            </a:br>
+            <a:r>
+              <a:rPr lang="en-US" sz="3200" dirty="0" smtClean="0">
+                <a:latin typeface="Calibri"/>
+                <a:cs typeface="Calibri"/>
+              </a:rPr>
+              <a:t>	- Average path length: 4.5, </a:t>
+            </a:r>
+            <a:r>
+              <a:rPr lang="en-US" sz="3200" dirty="0" err="1" smtClean="0">
+                <a:latin typeface="Calibri"/>
+                <a:cs typeface="Calibri"/>
+              </a:rPr>
+              <a:t>std</a:t>
+            </a:r>
+            <a:r>
+              <a:rPr lang="en-US" sz="3200" dirty="0" smtClean="0">
+                <a:latin typeface="Calibri"/>
+                <a:cs typeface="Calibri"/>
+              </a:rPr>
+              <a:t>: 0.97</a:t>
+            </a:r>
           </a:p>
         </p:txBody>
       </p:sp>
     </p:spTree>
   </p:cSld>
+  <p:clrMapOvr>
+    <a:masterClrMapping/>
+  </p:clrMapOvr>
   <p:timing>
     <p:tnLst>
       <p:par>
-        <p:cTn id="19" dur="indefinite" restart="never" nodeType="tmRoot">
+        <p:cTn xmlns:p14="http://schemas.microsoft.com/office/powerpoint/2010/main" id="1" dur="indefinite" restart="never" nodeType="tmRoot">
           <p:childTnLst>
             <p:seq>
-              <p:cTn id="20" nodeType="mainSeq"/>
+              <p:cTn id="2" nodeType="mainSeq"/>
               <p:prevCondLst>
-                <p:cond delay="0" evt="onPrev">
+                <p:cond evt="onPrev" delay="0">
                   <p:tgtEl>
                     <p:sldTgt/>
                   </p:tgtEl>
                 </p:cond>
               </p:prevCondLst>
               <p:nextCondLst>
-                <p:cond delay="0" evt="onNext">
+                <p:cond evt="onNext" delay="0">
                   <p:tgtEl>
                     <p:sldTgt/>
                   </p:tgtEl>
@@ -3375,7 +3712,7 @@
 </file>
 
 <file path=ppt/slides/slide11.xml><?xml version="1.0" encoding="utf-8"?>
-<p:sld xmlns:a="http://schemas.openxmlformats.org/drawingml/2006/main" xmlns:p="http://schemas.openxmlformats.org/presentationml/2006/main" xmlns:r="http://schemas.openxmlformats.org/officeDocument/2006/relationships">
+<p:sld xmlns:a="http://schemas.openxmlformats.org/drawingml/2006/main" xmlns:r="http://schemas.openxmlformats.org/officeDocument/2006/relationships" xmlns:p="http://schemas.openxmlformats.org/presentationml/2006/main">
   <p:cSld>
     <p:spTree>
       <p:nvGrpSpPr>
@@ -3399,7 +3736,7 @@
         </p:nvGraphicFramePr>
         <p:xfrm>
           <a:off x="457200" y="1600200"/>
-          <a:ext cx="8228880" cy="2237400"/>
+          <a:ext cx="8229240" cy="2237400"/>
         </p:xfrm>
         <a:graphic>
           <a:graphicData uri="http://schemas.openxmlformats.org/drawingml/2006/table">
@@ -3413,7 +3750,8 @@
               <a:tr h="447480">
                 <a:tc>
                   <a:txBody>
-                    <a:bodyPr wrap="none" lIns="90000" rIns="90000" tIns="46800" bIns="46800"/>
+                    <a:bodyPr/>
+                    <a:lstStyle/>
                     <a:p>
                       <a:pPr algn="ctr"/>
                       <a:r>
@@ -3427,7 +3765,8 @@
                 </a:tc>
                 <a:tc>
                   <a:txBody>
-                    <a:bodyPr wrap="none" lIns="90000" rIns="90000" tIns="46800" bIns="46800"/>
+                    <a:bodyPr/>
+                    <a:lstStyle/>
                     <a:p>
                       <a:pPr algn="ctr"/>
                       <a:r>
@@ -3441,7 +3780,8 @@
                 </a:tc>
                 <a:tc>
                   <a:txBody>
-                    <a:bodyPr wrap="none" lIns="90000" rIns="90000" tIns="46800" bIns="46800"/>
+                    <a:bodyPr/>
+                    <a:lstStyle/>
                     <a:p>
                       <a:pPr algn="ctr"/>
                       <a:r>
@@ -3457,7 +3797,8 @@
               <a:tr h="447480">
                 <a:tc>
                   <a:txBody>
-                    <a:bodyPr wrap="none" lIns="90000" rIns="90000" tIns="46800" bIns="46800"/>
+                    <a:bodyPr/>
+                    <a:lstStyle/>
                     <a:p>
                       <a:pPr algn="ctr"/>
                       <a:r>
@@ -3471,7 +3812,8 @@
                 </a:tc>
                 <a:tc>
                   <a:txBody>
-                    <a:bodyPr wrap="none" lIns="90000" rIns="90000" tIns="46800" bIns="46800"/>
+                    <a:bodyPr/>
+                    <a:lstStyle/>
                     <a:p>
                       <a:pPr algn="ctr"/>
                       <a:r>
@@ -3485,7 +3827,8 @@
                 </a:tc>
                 <a:tc>
                   <a:txBody>
-                    <a:bodyPr wrap="none" lIns="90000" rIns="90000" tIns="46800" bIns="46800"/>
+                    <a:bodyPr/>
+                    <a:lstStyle/>
                     <a:p>
                       <a:pPr algn="ctr"/>
                       <a:r>
@@ -3501,7 +3844,8 @@
               <a:tr h="447480">
                 <a:tc>
                   <a:txBody>
-                    <a:bodyPr wrap="none" lIns="90000" rIns="90000" tIns="46800" bIns="46800"/>
+                    <a:bodyPr/>
+                    <a:lstStyle/>
                     <a:p>
                       <a:pPr algn="ctr"/>
                       <a:r>
@@ -3515,7 +3859,8 @@
                 </a:tc>
                 <a:tc>
                   <a:txBody>
-                    <a:bodyPr wrap="none" lIns="90000" rIns="90000" tIns="46800" bIns="46800"/>
+                    <a:bodyPr/>
+                    <a:lstStyle/>
                     <a:p>
                       <a:pPr algn="ctr"/>
                       <a:r>
@@ -3529,7 +3874,8 @@
                 </a:tc>
                 <a:tc>
                   <a:txBody>
-                    <a:bodyPr wrap="none" lIns="90000" rIns="90000" tIns="46800" bIns="46800"/>
+                    <a:bodyPr/>
+                    <a:lstStyle/>
                     <a:p>
                       <a:pPr algn="ctr"/>
                       <a:r>
@@ -3545,7 +3891,8 @@
               <a:tr h="447480">
                 <a:tc>
                   <a:txBody>
-                    <a:bodyPr wrap="none" lIns="90000" rIns="90000" tIns="46800" bIns="46800"/>
+                    <a:bodyPr/>
+                    <a:lstStyle/>
                     <a:p>
                       <a:pPr algn="ctr"/>
                       <a:r>
@@ -3559,7 +3906,8 @@
                 </a:tc>
                 <a:tc>
                   <a:txBody>
-                    <a:bodyPr wrap="none" lIns="90000" rIns="90000" tIns="46800" bIns="46800"/>
+                    <a:bodyPr/>
+                    <a:lstStyle/>
                     <a:p>
                       <a:pPr algn="ctr"/>
                       <a:r>
@@ -3573,7 +3921,8 @@
                 </a:tc>
                 <a:tc>
                   <a:txBody>
-                    <a:bodyPr wrap="none" lIns="90000" rIns="90000" tIns="46800" bIns="46800"/>
+                    <a:bodyPr/>
+                    <a:lstStyle/>
                     <a:p>
                       <a:pPr algn="ctr"/>
                       <a:r>
@@ -3589,7 +3938,8 @@
               <a:tr h="447480">
                 <a:tc>
                   <a:txBody>
-                    <a:bodyPr wrap="none" lIns="90000" rIns="90000" tIns="46800" bIns="46800"/>
+                    <a:bodyPr/>
+                    <a:lstStyle/>
                     <a:p>
                       <a:pPr algn="ctr"/>
                       <a:r>
@@ -3603,7 +3953,8 @@
                 </a:tc>
                 <a:tc>
                   <a:txBody>
-                    <a:bodyPr wrap="none" lIns="90000" rIns="90000" tIns="46800" bIns="46800"/>
+                    <a:bodyPr/>
+                    <a:lstStyle/>
                     <a:p>
                       <a:pPr algn="ctr"/>
                       <a:r>
@@ -3617,7 +3968,8 @@
                 </a:tc>
                 <a:tc>
                   <a:txBody>
-                    <a:bodyPr wrap="none" lIns="90000" rIns="90000" tIns="46800" bIns="46800"/>
+                    <a:bodyPr/>
+                    <a:lstStyle/>
                     <a:p>
                       <a:pPr algn="ctr"/>
                       <a:r>
@@ -3651,6 +4003,7 @@
         </p:spPr>
         <p:txBody>
           <a:bodyPr anchor="ctr"/>
+          <a:lstStyle/>
           <a:p>
             <a:pPr algn="ctr">
               <a:lnSpc>
@@ -3672,22 +4025,25 @@
       </p:sp>
     </p:spTree>
   </p:cSld>
+  <p:clrMapOvr>
+    <a:masterClrMapping/>
+  </p:clrMapOvr>
   <p:timing>
     <p:tnLst>
       <p:par>
-        <p:cTn id="21" dur="indefinite" restart="never" nodeType="tmRoot">
+        <p:cTn xmlns:p14="http://schemas.microsoft.com/office/powerpoint/2010/main" id="1" dur="indefinite" restart="never" nodeType="tmRoot">
           <p:childTnLst>
             <p:seq>
-              <p:cTn id="22" nodeType="mainSeq"/>
+              <p:cTn id="2" nodeType="mainSeq"/>
               <p:prevCondLst>
-                <p:cond delay="0" evt="onPrev">
+                <p:cond evt="onPrev" delay="0">
                   <p:tgtEl>
                     <p:sldTgt/>
                   </p:tgtEl>
                 </p:cond>
               </p:prevCondLst>
               <p:nextCondLst>
-                <p:cond delay="0" evt="onNext">
+                <p:cond evt="onNext" delay="0">
                   <p:tgtEl>
                     <p:sldTgt/>
                   </p:tgtEl>
@@ -3703,7 +4059,7 @@
 </file>
 
 <file path=ppt/slides/slide12.xml><?xml version="1.0" encoding="utf-8"?>
-<p:sld xmlns:a="http://schemas.openxmlformats.org/drawingml/2006/main" xmlns:p="http://schemas.openxmlformats.org/presentationml/2006/main" xmlns:r="http://schemas.openxmlformats.org/officeDocument/2006/relationships">
+<p:sld xmlns:a="http://schemas.openxmlformats.org/drawingml/2006/main" xmlns:r="http://schemas.openxmlformats.org/officeDocument/2006/relationships" xmlns:p="http://schemas.openxmlformats.org/presentationml/2006/main">
   <p:cSld>
     <p:spTree>
       <p:nvGrpSpPr>
@@ -3736,6 +4092,7 @@
         </p:spPr>
         <p:txBody>
           <a:bodyPr anchor="ctr"/>
+          <a:lstStyle/>
           <a:p>
             <a:pPr algn="ctr">
               <a:lnSpc>
@@ -3763,7 +4120,7 @@
         </p:nvGraphicFramePr>
         <p:xfrm>
           <a:off x="457200" y="1600200"/>
-          <a:ext cx="8228880" cy="2237400"/>
+          <a:ext cx="8229240" cy="2237400"/>
         </p:xfrm>
         <a:graphic>
           <a:graphicData uri="http://schemas.openxmlformats.org/drawingml/2006/table">
@@ -3777,7 +4134,8 @@
               <a:tr h="447480">
                 <a:tc>
                   <a:txBody>
-                    <a:bodyPr wrap="none" lIns="90000" rIns="90000" tIns="46800" bIns="46800"/>
+                    <a:bodyPr/>
+                    <a:lstStyle/>
                     <a:p>
                       <a:pPr algn="ctr"/>
                       <a:r>
@@ -3791,7 +4149,8 @@
                 </a:tc>
                 <a:tc>
                   <a:txBody>
-                    <a:bodyPr wrap="none" lIns="90000" rIns="90000" tIns="46800" bIns="46800"/>
+                    <a:bodyPr/>
+                    <a:lstStyle/>
                     <a:p>
                       <a:pPr algn="ctr"/>
                       <a:r>
@@ -3805,7 +4164,8 @@
                 </a:tc>
                 <a:tc>
                   <a:txBody>
-                    <a:bodyPr wrap="none" lIns="90000" rIns="90000" tIns="46800" bIns="46800"/>
+                    <a:bodyPr/>
+                    <a:lstStyle/>
                     <a:p>
                       <a:pPr algn="ctr"/>
                       <a:r>
@@ -3821,7 +4181,8 @@
               <a:tr h="447480">
                 <a:tc>
                   <a:txBody>
-                    <a:bodyPr wrap="none" lIns="90000" rIns="90000" tIns="46800" bIns="46800"/>
+                    <a:bodyPr/>
+                    <a:lstStyle/>
                     <a:p>
                       <a:pPr algn="ctr"/>
                       <a:r>
@@ -3835,7 +4196,8 @@
                 </a:tc>
                 <a:tc>
                   <a:txBody>
-                    <a:bodyPr wrap="none" lIns="90000" rIns="90000" tIns="46800" bIns="46800"/>
+                    <a:bodyPr/>
+                    <a:lstStyle/>
                     <a:p>
                       <a:pPr algn="ctr"/>
                       <a:r>
@@ -3849,7 +4211,8 @@
                 </a:tc>
                 <a:tc>
                   <a:txBody>
-                    <a:bodyPr wrap="none" lIns="90000" rIns="90000" tIns="46800" bIns="46800"/>
+                    <a:bodyPr/>
+                    <a:lstStyle/>
                     <a:p>
                       <a:pPr algn="ctr"/>
                       <a:r>
@@ -3865,7 +4228,8 @@
               <a:tr h="447480">
                 <a:tc>
                   <a:txBody>
-                    <a:bodyPr wrap="none" lIns="90000" rIns="90000" tIns="46800" bIns="46800"/>
+                    <a:bodyPr/>
+                    <a:lstStyle/>
                     <a:p>
                       <a:pPr algn="ctr"/>
                       <a:r>
@@ -3879,7 +4243,8 @@
                 </a:tc>
                 <a:tc>
                   <a:txBody>
-                    <a:bodyPr wrap="none" lIns="90000" rIns="90000" tIns="46800" bIns="46800"/>
+                    <a:bodyPr/>
+                    <a:lstStyle/>
                     <a:p>
                       <a:pPr algn="ctr"/>
                       <a:r>
@@ -3893,7 +4258,8 @@
                 </a:tc>
                 <a:tc>
                   <a:txBody>
-                    <a:bodyPr wrap="none" lIns="90000" rIns="90000" tIns="46800" bIns="46800"/>
+                    <a:bodyPr/>
+                    <a:lstStyle/>
                     <a:p>
                       <a:pPr algn="ctr"/>
                       <a:r>
@@ -3911,7 +4277,8 @@
               <a:tr h="447480">
                 <a:tc>
                   <a:txBody>
-                    <a:bodyPr wrap="none" lIns="90000" rIns="90000" tIns="46800" bIns="46800"/>
+                    <a:bodyPr/>
+                    <a:lstStyle/>
                     <a:p>
                       <a:pPr algn="ctr"/>
                       <a:r>
@@ -3925,7 +4292,8 @@
                 </a:tc>
                 <a:tc>
                   <a:txBody>
-                    <a:bodyPr wrap="none" lIns="90000" rIns="90000" tIns="46800" bIns="46800"/>
+                    <a:bodyPr/>
+                    <a:lstStyle/>
                     <a:p>
                       <a:pPr algn="ctr"/>
                       <a:r>
@@ -3939,7 +4307,8 @@
                 </a:tc>
                 <a:tc>
                   <a:txBody>
-                    <a:bodyPr wrap="none" lIns="90000" rIns="90000" tIns="46800" bIns="46800"/>
+                    <a:bodyPr/>
+                    <a:lstStyle/>
                     <a:p>
                       <a:pPr algn="ctr"/>
                       <a:r>
@@ -3955,7 +4324,8 @@
               <a:tr h="447480">
                 <a:tc>
                   <a:txBody>
-                    <a:bodyPr wrap="none" lIns="90000" rIns="90000" tIns="46800" bIns="46800"/>
+                    <a:bodyPr/>
+                    <a:lstStyle/>
                     <a:p>
                       <a:pPr algn="ctr"/>
                       <a:r>
@@ -3969,7 +4339,8 @@
                 </a:tc>
                 <a:tc>
                   <a:txBody>
-                    <a:bodyPr wrap="none" lIns="90000" rIns="90000" tIns="46800" bIns="46800"/>
+                    <a:bodyPr/>
+                    <a:lstStyle/>
                     <a:p>
                       <a:pPr algn="ctr"/>
                       <a:r>
@@ -3983,7 +4354,8 @@
                 </a:tc>
                 <a:tc>
                   <a:txBody>
-                    <a:bodyPr wrap="none" lIns="90000" rIns="90000" tIns="46800" bIns="46800"/>
+                    <a:bodyPr/>
+                    <a:lstStyle/>
                     <a:p>
                       <a:pPr algn="ctr"/>
                       <a:r>
@@ -4002,22 +4374,25 @@
       </p:graphicFrame>
     </p:spTree>
   </p:cSld>
+  <p:clrMapOvr>
+    <a:masterClrMapping/>
+  </p:clrMapOvr>
   <p:timing>
     <p:tnLst>
       <p:par>
-        <p:cTn id="23" dur="indefinite" restart="never" nodeType="tmRoot">
+        <p:cTn xmlns:p14="http://schemas.microsoft.com/office/powerpoint/2010/main" id="1" dur="indefinite" restart="never" nodeType="tmRoot">
           <p:childTnLst>
             <p:seq>
-              <p:cTn id="24" nodeType="mainSeq"/>
+              <p:cTn id="2" nodeType="mainSeq"/>
               <p:prevCondLst>
-                <p:cond delay="0" evt="onPrev">
+                <p:cond evt="onPrev" delay="0">
                   <p:tgtEl>
                     <p:sldTgt/>
                   </p:tgtEl>
                 </p:cond>
               </p:prevCondLst>
               <p:nextCondLst>
-                <p:cond delay="0" evt="onNext">
+                <p:cond evt="onNext" delay="0">
                   <p:tgtEl>
                     <p:sldTgt/>
                   </p:tgtEl>
@@ -4033,7 +4408,7 @@
 </file>
 
 <file path=ppt/slides/slide2.xml><?xml version="1.0" encoding="utf-8"?>
-<p:sld xmlns:a="http://schemas.openxmlformats.org/drawingml/2006/main" xmlns:p="http://schemas.openxmlformats.org/presentationml/2006/main" xmlns:r="http://schemas.openxmlformats.org/officeDocument/2006/relationships">
+<p:sld xmlns:a="http://schemas.openxmlformats.org/drawingml/2006/main" xmlns:r="http://schemas.openxmlformats.org/officeDocument/2006/relationships" xmlns:p="http://schemas.openxmlformats.org/presentationml/2006/main">
   <p:cSld>
     <p:spTree>
       <p:nvGrpSpPr>
@@ -4066,6 +4441,7 @@
         </p:spPr>
         <p:txBody>
           <a:bodyPr anchor="ctr"/>
+          <a:lstStyle/>
           <a:p>
             <a:pPr algn="ctr">
               <a:lnSpc>
@@ -4102,6 +4478,7 @@
         </p:spPr>
         <p:txBody>
           <a:bodyPr/>
+          <a:lstStyle/>
           <a:p>
             <a:pPr>
               <a:lnSpc>
@@ -4111,7 +4488,7 @@
               <a:buChar char="•"/>
             </a:pPr>
             <a:r>
-              <a:rPr lang="en-US" sz="3200">
+              <a:rPr lang="en-US" sz="2000" dirty="0">
                 <a:solidFill>
                   <a:srgbClr val="000000"/>
                 </a:solidFill>
@@ -4119,7 +4496,7 @@
               </a:rPr>
               <a:t>Problem</a:t>
             </a:r>
-            <a:endParaRPr/>
+            <a:endParaRPr sz="2000" dirty="0"/>
           </a:p>
           <a:p>
             <a:pPr>
@@ -4130,7 +4507,7 @@
               <a:buChar char="•"/>
             </a:pPr>
             <a:r>
-              <a:rPr lang="en-US" sz="3200">
+              <a:rPr lang="en-US" sz="2000" dirty="0">
                 <a:solidFill>
                   <a:srgbClr val="000000"/>
                 </a:solidFill>
@@ -4138,7 +4515,7 @@
               </a:rPr>
               <a:t>Related Work</a:t>
             </a:r>
-            <a:endParaRPr/>
+            <a:endParaRPr sz="2000" dirty="0"/>
           </a:p>
           <a:p>
             <a:pPr lvl="1">
@@ -4149,7 +4526,7 @@
               <a:buChar char="–"/>
             </a:pPr>
             <a:r>
-              <a:rPr lang="en-US" sz="2800">
+              <a:rPr lang="en-US" sz="2000" dirty="0" err="1">
                 <a:solidFill>
                   <a:srgbClr val="000000"/>
                 </a:solidFill>
@@ -4157,7 +4534,7 @@
               </a:rPr>
               <a:t>PathSim</a:t>
             </a:r>
-            <a:endParaRPr/>
+            <a:endParaRPr sz="2000" dirty="0"/>
           </a:p>
           <a:p>
             <a:pPr lvl="1">
@@ -4168,7 +4545,7 @@
               <a:buChar char="–"/>
             </a:pPr>
             <a:r>
-              <a:rPr lang="en-US" sz="2800">
+              <a:rPr lang="en-US" sz="2000" dirty="0">
                 <a:solidFill>
                   <a:srgbClr val="000000"/>
                 </a:solidFill>
@@ -4176,7 +4553,7 @@
               </a:rPr>
               <a:t>OLAP operations: roll-up, drill-down, slice</a:t>
             </a:r>
-            <a:endParaRPr/>
+            <a:endParaRPr sz="2000" dirty="0"/>
           </a:p>
           <a:p>
             <a:pPr>
@@ -4187,7 +4564,7 @@
               <a:buChar char="•"/>
             </a:pPr>
             <a:r>
-              <a:rPr lang="en-US" sz="3200">
+              <a:rPr lang="en-US" sz="2000" dirty="0">
                 <a:solidFill>
                   <a:srgbClr val="000000"/>
                 </a:solidFill>
@@ -4195,7 +4572,7 @@
               </a:rPr>
               <a:t>Dataset</a:t>
             </a:r>
-            <a:endParaRPr/>
+            <a:endParaRPr sz="2000" dirty="0"/>
           </a:p>
           <a:p>
             <a:pPr>
@@ -4206,7 +4583,7 @@
               <a:buChar char="•"/>
             </a:pPr>
             <a:r>
-              <a:rPr lang="en-US" sz="3200">
+              <a:rPr lang="en-US" sz="2000" dirty="0">
                 <a:solidFill>
                   <a:srgbClr val="000000"/>
                 </a:solidFill>
@@ -4214,7 +4591,7 @@
               </a:rPr>
               <a:t>Contribution</a:t>
             </a:r>
-            <a:endParaRPr/>
+            <a:endParaRPr sz="2000" dirty="0"/>
           </a:p>
           <a:p>
             <a:pPr lvl="1">
@@ -4225,7 +4602,7 @@
               <a:buChar char="–"/>
             </a:pPr>
             <a:r>
-              <a:rPr lang="en-US" sz="2800">
+              <a:rPr lang="en-US" sz="2000" dirty="0">
                 <a:solidFill>
                   <a:srgbClr val="000000"/>
                 </a:solidFill>
@@ -4233,7 +4610,7 @@
               </a:rPr>
               <a:t>Better Storage</a:t>
             </a:r>
-            <a:endParaRPr/>
+            <a:endParaRPr sz="2000" dirty="0"/>
           </a:p>
           <a:p>
             <a:pPr lvl="1">
@@ -4244,7 +4621,7 @@
               <a:buChar char="–"/>
             </a:pPr>
             <a:r>
-              <a:rPr lang="en-US" sz="2800">
+              <a:rPr lang="en-US" sz="2000" dirty="0">
                 <a:solidFill>
                   <a:srgbClr val="000000"/>
                 </a:solidFill>
@@ -4252,7 +4629,7 @@
               </a:rPr>
               <a:t>Handling Hierarchies</a:t>
             </a:r>
-            <a:endParaRPr/>
+            <a:endParaRPr sz="2000" dirty="0"/>
           </a:p>
           <a:p>
             <a:pPr lvl="1">
@@ -4263,7 +4640,7 @@
               <a:buChar char="–"/>
             </a:pPr>
             <a:r>
-              <a:rPr lang="en-US" sz="2800">
+              <a:rPr lang="en-US" sz="2000" dirty="0">
                 <a:solidFill>
                   <a:srgbClr val="000000"/>
                 </a:solidFill>
@@ -4271,7 +4648,7 @@
               </a:rPr>
               <a:t>User-specified constraints</a:t>
             </a:r>
-            <a:endParaRPr/>
+            <a:endParaRPr sz="2000" dirty="0"/>
           </a:p>
           <a:p>
             <a:pPr>
@@ -4282,7 +4659,7 @@
               <a:buChar char="•"/>
             </a:pPr>
             <a:r>
-              <a:rPr lang="en-US" sz="3200">
+              <a:rPr lang="en-US" sz="2000" dirty="0">
                 <a:solidFill>
                   <a:srgbClr val="000000"/>
                 </a:solidFill>
@@ -4290,7 +4667,7 @@
               </a:rPr>
               <a:t>Results</a:t>
             </a:r>
-            <a:endParaRPr/>
+            <a:endParaRPr sz="2000" dirty="0"/>
           </a:p>
           <a:p>
             <a:pPr lvl="1">
@@ -4301,7 +4678,7 @@
               <a:buChar char="–"/>
             </a:pPr>
             <a:r>
-              <a:rPr lang="en-US" sz="2800">
+              <a:rPr lang="en-US" sz="2000" dirty="0">
                 <a:solidFill>
                   <a:srgbClr val="000000"/>
                 </a:solidFill>
@@ -4309,7 +4686,7 @@
               </a:rPr>
               <a:t>Network Statistics</a:t>
             </a:r>
-            <a:endParaRPr/>
+            <a:endParaRPr sz="2000" dirty="0"/>
           </a:p>
           <a:p>
             <a:pPr lvl="1">
@@ -4320,15 +4697,24 @@
               <a:buChar char="–"/>
             </a:pPr>
             <a:r>
-              <a:rPr lang="en-US" sz="2800">
-                <a:solidFill>
-                  <a:srgbClr val="000000"/>
-                </a:solidFill>
-                <a:latin typeface="Calibri"/>
-              </a:rPr>
-              <a:t>hPathSim run-time and memory</a:t>
-            </a:r>
-            <a:endParaRPr/>
+              <a:rPr lang="en-US" sz="2000" dirty="0" err="1">
+                <a:solidFill>
+                  <a:srgbClr val="000000"/>
+                </a:solidFill>
+                <a:latin typeface="Calibri"/>
+              </a:rPr>
+              <a:t>hPathSim</a:t>
+            </a:r>
+            <a:r>
+              <a:rPr lang="en-US" sz="2000" dirty="0">
+                <a:solidFill>
+                  <a:srgbClr val="000000"/>
+                </a:solidFill>
+                <a:latin typeface="Calibri"/>
+              </a:rPr>
+              <a:t> run-time and memory</a:t>
+            </a:r>
+            <a:endParaRPr sz="2000" dirty="0"/>
           </a:p>
           <a:p>
             <a:pPr>
@@ -4339,7 +4725,7 @@
               <a:buChar char="•"/>
             </a:pPr>
             <a:r>
-              <a:rPr lang="en-US" sz="3200">
+              <a:rPr lang="en-US" sz="2000" dirty="0">
                 <a:solidFill>
                   <a:srgbClr val="000000"/>
                 </a:solidFill>
@@ -4347,7 +4733,7 @@
               </a:rPr>
               <a:t>Live Demo</a:t>
             </a:r>
-            <a:endParaRPr/>
+            <a:endParaRPr sz="2000" dirty="0"/>
           </a:p>
           <a:p>
             <a:pPr>
@@ -4358,7 +4744,7 @@
               <a:buChar char="•"/>
             </a:pPr>
             <a:r>
-              <a:rPr lang="en-US" sz="3200">
+              <a:rPr lang="en-US" sz="2000" dirty="0">
                 <a:solidFill>
                   <a:srgbClr val="000000"/>
                 </a:solidFill>
@@ -4366,31 +4752,34 @@
               </a:rPr>
               <a:t>Discussion</a:t>
             </a:r>
-            <a:endParaRPr/>
-          </a:p>
-          <a:p>
-            <a:endParaRPr/>
+            <a:endParaRPr sz="2000" dirty="0"/>
+          </a:p>
+          <a:p>
+            <a:endParaRPr dirty="0"/>
           </a:p>
         </p:txBody>
       </p:sp>
     </p:spTree>
   </p:cSld>
+  <p:clrMapOvr>
+    <a:masterClrMapping/>
+  </p:clrMapOvr>
   <p:timing>
     <p:tnLst>
       <p:par>
-        <p:cTn id="3" dur="indefinite" restart="never" nodeType="tmRoot">
+        <p:cTn xmlns:p14="http://schemas.microsoft.com/office/powerpoint/2010/main" id="1" dur="indefinite" restart="never" nodeType="tmRoot">
           <p:childTnLst>
             <p:seq>
-              <p:cTn id="4" nodeType="mainSeq"/>
+              <p:cTn id="2" nodeType="mainSeq"/>
               <p:prevCondLst>
-                <p:cond delay="0" evt="onPrev">
+                <p:cond evt="onPrev" delay="0">
                   <p:tgtEl>
                     <p:sldTgt/>
                   </p:tgtEl>
                 </p:cond>
               </p:prevCondLst>
               <p:nextCondLst>
-                <p:cond delay="0" evt="onNext">
+                <p:cond evt="onNext" delay="0">
                   <p:tgtEl>
                     <p:sldTgt/>
                   </p:tgtEl>
@@ -4406,7 +4795,7 @@
 </file>
 
 <file path=ppt/slides/slide3.xml><?xml version="1.0" encoding="utf-8"?>
-<p:sld xmlns:a="http://schemas.openxmlformats.org/drawingml/2006/main" xmlns:p="http://schemas.openxmlformats.org/presentationml/2006/main" xmlns:r="http://schemas.openxmlformats.org/officeDocument/2006/relationships">
+<p:sld xmlns:a="http://schemas.openxmlformats.org/drawingml/2006/main" xmlns:r="http://schemas.openxmlformats.org/officeDocument/2006/relationships" xmlns:p="http://schemas.openxmlformats.org/presentationml/2006/main">
   <p:cSld>
     <p:spTree>
       <p:nvGrpSpPr>
@@ -4439,6 +4828,7 @@
         </p:spPr>
         <p:txBody>
           <a:bodyPr anchor="ctr"/>
+          <a:lstStyle/>
           <a:p>
             <a:pPr algn="ctr">
               <a:lnSpc>
@@ -4475,6 +4865,7 @@
         </p:spPr>
         <p:txBody>
           <a:bodyPr/>
+          <a:lstStyle/>
           <a:p>
             <a:pPr>
               <a:lnSpc>
@@ -4490,16 +4881,7 @@
                 </a:solidFill>
                 <a:latin typeface="Calibri"/>
               </a:rPr>
-              <a:t>Similarity search using PathSim on networks is expensive.</a:t>
-            </a:r>
-            <a:r>
-              <a:rPr lang="en-US" sz="3200">
-                <a:solidFill>
-                  <a:srgbClr val="000000"/>
-                </a:solidFill>
-                <a:latin typeface="Calibri"/>
-              </a:rPr>
-              <a:t>
+              <a:t>Similarity search using PathSim on networks is expensive.
 </a:t>
             </a:r>
             <a:endParaRPr/>
@@ -4519,16 +4901,7 @@
                 </a:solidFill>
                 <a:latin typeface="Calibri"/>
               </a:rPr>
-              <a:t>We can not apply similarity search under specific context. (e.g. applying an OLAP operation first)</a:t>
-            </a:r>
-            <a:r>
-              <a:rPr lang="en-US" sz="3200">
-                <a:solidFill>
-                  <a:srgbClr val="000000"/>
-                </a:solidFill>
-                <a:latin typeface="Calibri"/>
-              </a:rPr>
-              <a:t>
+              <a:t>We can not apply similarity search under specific context. (e.g. applying an OLAP operation first)
 </a:t>
             </a:r>
             <a:endParaRPr/>
@@ -4556,22 +4929,25 @@
       </p:sp>
     </p:spTree>
   </p:cSld>
+  <p:clrMapOvr>
+    <a:masterClrMapping/>
+  </p:clrMapOvr>
   <p:timing>
     <p:tnLst>
       <p:par>
-        <p:cTn id="5" dur="indefinite" restart="never" nodeType="tmRoot">
+        <p:cTn xmlns:p14="http://schemas.microsoft.com/office/powerpoint/2010/main" id="1" dur="indefinite" restart="never" nodeType="tmRoot">
           <p:childTnLst>
             <p:seq>
-              <p:cTn id="6" nodeType="mainSeq"/>
+              <p:cTn id="2" nodeType="mainSeq"/>
               <p:prevCondLst>
-                <p:cond delay="0" evt="onPrev">
+                <p:cond evt="onPrev" delay="0">
                   <p:tgtEl>
                     <p:sldTgt/>
                   </p:tgtEl>
                 </p:cond>
               </p:prevCondLst>
               <p:nextCondLst>
-                <p:cond delay="0" evt="onNext">
+                <p:cond evt="onNext" delay="0">
                   <p:tgtEl>
                     <p:sldTgt/>
                   </p:tgtEl>
@@ -4587,7 +4963,7 @@
 </file>
 
 <file path=ppt/slides/slide4.xml><?xml version="1.0" encoding="utf-8"?>
-<p:sld xmlns:a="http://schemas.openxmlformats.org/drawingml/2006/main" xmlns:p="http://schemas.openxmlformats.org/presentationml/2006/main" xmlns:r="http://schemas.openxmlformats.org/officeDocument/2006/relationships">
+<p:sld xmlns:a="http://schemas.openxmlformats.org/drawingml/2006/main" xmlns:r="http://schemas.openxmlformats.org/officeDocument/2006/relationships" xmlns:p="http://schemas.openxmlformats.org/presentationml/2006/main">
   <p:cSld>
     <p:spTree>
       <p:nvGrpSpPr>
@@ -4620,6 +4996,7 @@
         </p:spPr>
         <p:txBody>
           <a:bodyPr anchor="ctr"/>
+          <a:lstStyle/>
           <a:p>
             <a:pPr algn="ctr">
               <a:lnSpc>
@@ -4656,6 +5033,7 @@
         </p:spPr>
         <p:txBody>
           <a:bodyPr/>
+          <a:lstStyle/>
           <a:p>
             <a:pPr>
               <a:lnSpc>
@@ -4665,15 +5043,32 @@
               <a:buChar char="•"/>
             </a:pPr>
             <a:r>
-              <a:rPr lang="en-US" sz="3200">
-                <a:solidFill>
-                  <a:srgbClr val="000000"/>
-                </a:solidFill>
-                <a:latin typeface="Calibri"/>
-              </a:rPr>
-              <a:t>Computing similarity in heterogeneous networks.</a:t>
-            </a:r>
-            <a:endParaRPr/>
+              <a:rPr lang="en-US" sz="3200" dirty="0">
+                <a:solidFill>
+                  <a:srgbClr val="000000"/>
+                </a:solidFill>
+                <a:latin typeface="Calibri"/>
+              </a:rPr>
+              <a:t>Computing similarity in heterogeneous networks</a:t>
+            </a:r>
+            <a:r>
+              <a:rPr lang="en-US" sz="3200" dirty="0" smtClean="0">
+                <a:solidFill>
+                  <a:srgbClr val="000000"/>
+                </a:solidFill>
+                <a:latin typeface="Calibri"/>
+              </a:rPr>
+              <a:t>.</a:t>
+            </a:r>
+            <a:br>
+              <a:rPr lang="en-US" sz="3200" dirty="0" smtClean="0">
+                <a:solidFill>
+                  <a:srgbClr val="000000"/>
+                </a:solidFill>
+                <a:latin typeface="Calibri"/>
+              </a:rPr>
+            </a:br>
+            <a:endParaRPr dirty="0"/>
           </a:p>
           <a:p>
             <a:pPr>
@@ -4684,15 +5079,32 @@
               <a:buChar char="•"/>
             </a:pPr>
             <a:r>
-              <a:rPr lang="en-US" sz="3200">
-                <a:solidFill>
-                  <a:srgbClr val="000000"/>
-                </a:solidFill>
-                <a:latin typeface="Calibri"/>
-              </a:rPr>
-              <a:t>Favor “peers”- objects with strong connectivity and similar visibility under a meta-path.</a:t>
-            </a:r>
-            <a:endParaRPr/>
+              <a:rPr lang="en-US" sz="3200" dirty="0">
+                <a:solidFill>
+                  <a:srgbClr val="000000"/>
+                </a:solidFill>
+                <a:latin typeface="Calibri"/>
+              </a:rPr>
+              <a:t>Favor “peers”- objects with strong connectivity and similar visibility under a meta-path</a:t>
+            </a:r>
+            <a:r>
+              <a:rPr lang="en-US" sz="3200" dirty="0" smtClean="0">
+                <a:solidFill>
+                  <a:srgbClr val="000000"/>
+                </a:solidFill>
+                <a:latin typeface="Calibri"/>
+              </a:rPr>
+              <a:t>.</a:t>
+            </a:r>
+            <a:br>
+              <a:rPr lang="en-US" sz="3200" dirty="0" smtClean="0">
+                <a:solidFill>
+                  <a:srgbClr val="000000"/>
+                </a:solidFill>
+                <a:latin typeface="Calibri"/>
+              </a:rPr>
+            </a:br>
+            <a:endParaRPr dirty="0"/>
           </a:p>
           <a:p>
             <a:pPr>
@@ -4703,7 +5115,7 @@
               <a:buChar char="•"/>
             </a:pPr>
             <a:r>
-              <a:rPr lang="en-US" sz="3200">
+              <a:rPr lang="en-US" sz="3200" dirty="0">
                 <a:solidFill>
                   <a:srgbClr val="000000"/>
                 </a:solidFill>
@@ -4711,28 +5123,31 @@
               </a:rPr>
               <a:t>Example meta-paths: author-paper-author (co-authors), author-paper-venue-paper-author (submitted to same conference).</a:t>
             </a:r>
-            <a:endParaRPr/>
+            <a:endParaRPr dirty="0"/>
           </a:p>
         </p:txBody>
       </p:sp>
     </p:spTree>
   </p:cSld>
+  <p:clrMapOvr>
+    <a:masterClrMapping/>
+  </p:clrMapOvr>
   <p:timing>
     <p:tnLst>
       <p:par>
-        <p:cTn id="7" dur="indefinite" restart="never" nodeType="tmRoot">
+        <p:cTn xmlns:p14="http://schemas.microsoft.com/office/powerpoint/2010/main" id="1" dur="indefinite" restart="never" nodeType="tmRoot">
           <p:childTnLst>
             <p:seq>
-              <p:cTn id="8" nodeType="mainSeq"/>
+              <p:cTn id="2" nodeType="mainSeq"/>
               <p:prevCondLst>
-                <p:cond delay="0" evt="onPrev">
+                <p:cond evt="onPrev" delay="0">
                   <p:tgtEl>
                     <p:sldTgt/>
                   </p:tgtEl>
                 </p:cond>
               </p:prevCondLst>
               <p:nextCondLst>
-                <p:cond delay="0" evt="onNext">
+                <p:cond evt="onNext" delay="0">
                   <p:tgtEl>
                     <p:sldTgt/>
                   </p:tgtEl>
@@ -4748,7 +5163,7 @@
 </file>
 
 <file path=ppt/slides/slide5.xml><?xml version="1.0" encoding="utf-8"?>
-<p:sld xmlns:a="http://schemas.openxmlformats.org/drawingml/2006/main" xmlns:p="http://schemas.openxmlformats.org/presentationml/2006/main" xmlns:r="http://schemas.openxmlformats.org/officeDocument/2006/relationships">
+<p:sld xmlns:a="http://schemas.openxmlformats.org/drawingml/2006/main" xmlns:r="http://schemas.openxmlformats.org/officeDocument/2006/relationships" xmlns:p="http://schemas.openxmlformats.org/presentationml/2006/main">
   <p:cSld>
     <p:spTree>
       <p:nvGrpSpPr>
@@ -4781,6 +5196,7 @@
         </p:spPr>
         <p:txBody>
           <a:bodyPr anchor="ctr"/>
+          <a:lstStyle/>
           <a:p>
             <a:pPr algn="ctr">
               <a:lnSpc>
@@ -4788,7 +5204,7 @@
               </a:lnSpc>
             </a:pPr>
             <a:r>
-              <a:rPr lang="en-US" sz="4400">
+              <a:rPr lang="en-US" sz="4400" dirty="0">
                 <a:solidFill>
                   <a:srgbClr val="000000"/>
                 </a:solidFill>
@@ -4796,7 +5212,7 @@
               </a:rPr>
               <a:t>Related Work: OLAP Operations</a:t>
             </a:r>
-            <a:endParaRPr/>
+            <a:endParaRPr dirty="0"/>
           </a:p>
         </p:txBody>
       </p:sp>
@@ -4817,6 +5233,7 @@
         </p:spPr>
         <p:txBody>
           <a:bodyPr/>
+          <a:lstStyle/>
           <a:p>
             <a:pPr>
               <a:lnSpc>
@@ -4894,22 +5311,25 @@
       </p:sp>
     </p:spTree>
   </p:cSld>
+  <p:clrMapOvr>
+    <a:masterClrMapping/>
+  </p:clrMapOvr>
   <p:timing>
     <p:tnLst>
       <p:par>
-        <p:cTn id="9" dur="indefinite" restart="never" nodeType="tmRoot">
+        <p:cTn xmlns:p14="http://schemas.microsoft.com/office/powerpoint/2010/main" id="1" dur="indefinite" restart="never" nodeType="tmRoot">
           <p:childTnLst>
             <p:seq>
-              <p:cTn id="10" nodeType="mainSeq"/>
+              <p:cTn id="2" nodeType="mainSeq"/>
               <p:prevCondLst>
-                <p:cond delay="0" evt="onPrev">
+                <p:cond evt="onPrev" delay="0">
                   <p:tgtEl>
                     <p:sldTgt/>
                   </p:tgtEl>
                 </p:cond>
               </p:prevCondLst>
               <p:nextCondLst>
-                <p:cond delay="0" evt="onNext">
+                <p:cond evt="onNext" delay="0">
                   <p:tgtEl>
                     <p:sldTgt/>
                   </p:tgtEl>
@@ -4925,7 +5345,7 @@
 </file>
 
 <file path=ppt/slides/slide6.xml><?xml version="1.0" encoding="utf-8"?>
-<p:sld xmlns:a="http://schemas.openxmlformats.org/drawingml/2006/main" xmlns:p="http://schemas.openxmlformats.org/presentationml/2006/main" xmlns:r="http://schemas.openxmlformats.org/officeDocument/2006/relationships">
+<p:sld xmlns:a="http://schemas.openxmlformats.org/drawingml/2006/main" xmlns:r="http://schemas.openxmlformats.org/officeDocument/2006/relationships" xmlns:p="http://schemas.openxmlformats.org/presentationml/2006/main">
   <p:cSld>
     <p:spTree>
       <p:nvGrpSpPr>
@@ -4958,6 +5378,7 @@
         </p:spPr>
         <p:txBody>
           <a:bodyPr anchor="ctr"/>
+          <a:lstStyle/>
           <a:p>
             <a:pPr algn="ctr">
               <a:lnSpc>
@@ -4977,732 +5398,57 @@
           </a:p>
         </p:txBody>
       </p:sp>
-      <p:sp>
-        <p:nvSpPr>
-          <p:cNvPr id="89" name="CustomShape 2"/>
-          <p:cNvSpPr/>
+      <p:pic>
+        <p:nvPicPr>
+          <p:cNvPr id="2" name="Picture 1" descr="nyt-dataset.png"/>
+          <p:cNvPicPr>
+            <a:picLocks noChangeAspect="1"/>
+          </p:cNvPicPr>
           <p:nvPr/>
-        </p:nvSpPr>
-        <p:spPr>
-          <a:xfrm>
-            <a:off x="5199480" y="3184560"/>
-            <a:ext cx="1357560" cy="1357560"/>
-          </a:xfrm>
-          <a:prstGeom prst="roundRect">
-            <a:avLst>
-              <a:gd name="adj" fmla="val 16667"/>
-            </a:avLst>
-          </a:prstGeom>
-          <a:solidFill>
-            <a:srgbClr val="4bacc6"/>
-          </a:solidFill>
-          <a:ln w="25560">
-            <a:solidFill>
-              <a:srgbClr val="ffffff"/>
-            </a:solidFill>
-            <a:round/>
-          </a:ln>
-        </p:spPr>
-        <p:txBody>
-          <a:bodyPr lIns="145080" rIns="78840" tIns="145080" bIns="78840" anchor="ctr"/>
-          <a:p>
-            <a:pPr algn="ctr">
-              <a:lnSpc>
-                <a:spcPct val="90000"/>
-              </a:lnSpc>
-            </a:pPr>
-            <a:r>
-              <a:rPr lang="en-US" sz="3100">
-                <a:solidFill>
-                  <a:srgbClr val="ffffff"/>
-                </a:solidFill>
-                <a:latin typeface="Calibri"/>
-              </a:rPr>
-              <a:t>Article</a:t>
-            </a:r>
-            <a:endParaRPr/>
-          </a:p>
-        </p:txBody>
-      </p:sp>
-      <p:sp>
-        <p:nvSpPr>
-          <p:cNvPr id="90" name="CustomShape 3"/>
-          <p:cNvSpPr/>
-          <p:nvPr/>
-        </p:nvSpPr>
-        <p:spPr>
-          <a:xfrm rot="16182600">
-            <a:off x="5536080" y="2847240"/>
-            <a:ext cx="674280" cy="360"/>
-          </a:xfrm>
-          <a:prstGeom prst="rect">
-            <a:avLst/>
-          </a:prstGeom>
-          <a:noFill/>
-          <a:ln w="25560">
-            <a:solidFill>
-              <a:srgbClr val="71b6cc"/>
-            </a:solidFill>
-            <a:round/>
-          </a:ln>
-        </p:spPr>
-      </p:sp>
-      <p:sp>
-        <p:nvSpPr>
-          <p:cNvPr id="91" name="CustomShape 4"/>
-          <p:cNvSpPr/>
-          <p:nvPr/>
-        </p:nvSpPr>
-        <p:spPr>
-          <a:xfrm>
-            <a:off x="5414400" y="1600200"/>
-            <a:ext cx="909360" cy="909360"/>
-          </a:xfrm>
-          <a:prstGeom prst="roundRect">
-            <a:avLst>
-              <a:gd name="adj" fmla="val 16667"/>
-            </a:avLst>
-          </a:prstGeom>
-          <a:solidFill>
-            <a:srgbClr val="4bacc6"/>
-          </a:solidFill>
-          <a:ln w="25560">
-            <a:solidFill>
-              <a:srgbClr val="ffffff"/>
-            </a:solidFill>
-            <a:round/>
-          </a:ln>
-        </p:spPr>
-        <p:txBody>
-          <a:bodyPr lIns="72360" rIns="28080" tIns="72360" bIns="28080" anchor="ctr"/>
-          <a:p>
-            <a:pPr algn="ctr">
-              <a:lnSpc>
-                <a:spcPct val="90000"/>
-              </a:lnSpc>
-            </a:pPr>
-            <a:r>
-              <a:rPr lang="en-US" sz="1100">
-                <a:solidFill>
-                  <a:srgbClr val="ffffff"/>
-                </a:solidFill>
-                <a:latin typeface="Calibri"/>
-              </a:rPr>
-              <a:t>Organization</a:t>
-            </a:r>
-            <a:endParaRPr/>
-          </a:p>
-        </p:txBody>
-      </p:sp>
-      <p:sp>
-        <p:nvSpPr>
-          <p:cNvPr id="92" name="CustomShape 5"/>
-          <p:cNvSpPr/>
-          <p:nvPr/>
-        </p:nvSpPr>
-        <p:spPr>
-          <a:xfrm>
-            <a:off x="6557040" y="3863520"/>
-            <a:ext cx="673560" cy="360"/>
-          </a:xfrm>
-          <a:prstGeom prst="rect">
-            <a:avLst/>
-          </a:prstGeom>
-          <a:noFill/>
-          <a:ln w="25560">
-            <a:solidFill>
-              <a:srgbClr val="71b6cc"/>
-            </a:solidFill>
-            <a:round/>
-          </a:ln>
-        </p:spPr>
-      </p:sp>
-      <p:sp>
-        <p:nvSpPr>
-          <p:cNvPr id="93" name="CustomShape 6"/>
-          <p:cNvSpPr/>
-          <p:nvPr/>
-        </p:nvSpPr>
-        <p:spPr>
-          <a:xfrm>
-            <a:off x="7231320" y="3408840"/>
-            <a:ext cx="909360" cy="909360"/>
-          </a:xfrm>
-          <a:prstGeom prst="roundRect">
-            <a:avLst>
-              <a:gd name="adj" fmla="val 16667"/>
-            </a:avLst>
-          </a:prstGeom>
-          <a:solidFill>
-            <a:srgbClr val="4bacc6"/>
-          </a:solidFill>
-          <a:ln w="25560">
-            <a:solidFill>
-              <a:srgbClr val="ffffff"/>
-            </a:solidFill>
-            <a:round/>
-          </a:ln>
-        </p:spPr>
-        <p:txBody>
-          <a:bodyPr lIns="95040" rIns="50760" tIns="95040" bIns="50760" anchor="ctr"/>
-          <a:p>
-            <a:pPr algn="ctr">
-              <a:lnSpc>
-                <a:spcPct val="90000"/>
-              </a:lnSpc>
-            </a:pPr>
-            <a:r>
-              <a:rPr lang="en-US" sz="2000">
-                <a:solidFill>
-                  <a:srgbClr val="ffffff"/>
-                </a:solidFill>
-                <a:latin typeface="Calibri"/>
-              </a:rPr>
-              <a:t>Person</a:t>
-            </a:r>
-            <a:endParaRPr/>
-          </a:p>
-        </p:txBody>
-      </p:sp>
-      <p:sp>
-        <p:nvSpPr>
-          <p:cNvPr id="94" name="CustomShape 7"/>
-          <p:cNvSpPr/>
-          <p:nvPr/>
-        </p:nvSpPr>
-        <p:spPr>
-          <a:xfrm rot="5400000">
-            <a:off x="5541120" y="4879080"/>
-            <a:ext cx="673560" cy="360"/>
-          </a:xfrm>
-          <a:prstGeom prst="rect">
-            <a:avLst/>
-          </a:prstGeom>
-          <a:noFill/>
-          <a:ln w="25560">
-            <a:solidFill>
-              <a:srgbClr val="71b6cc"/>
-            </a:solidFill>
-            <a:round/>
-          </a:ln>
-        </p:spPr>
-      </p:sp>
-      <p:sp>
-        <p:nvSpPr>
-          <p:cNvPr id="95" name="CustomShape 8"/>
-          <p:cNvSpPr/>
-          <p:nvPr/>
-        </p:nvSpPr>
-        <p:spPr>
-          <a:xfrm>
-            <a:off x="5423400" y="5216400"/>
-            <a:ext cx="909360" cy="909360"/>
-          </a:xfrm>
-          <a:prstGeom prst="roundRect">
-            <a:avLst>
-              <a:gd name="adj" fmla="val 16667"/>
-            </a:avLst>
-          </a:prstGeom>
-          <a:solidFill>
-            <a:srgbClr val="4bacc6"/>
-          </a:solidFill>
-          <a:ln w="25560">
-            <a:solidFill>
-              <a:srgbClr val="ffffff"/>
-            </a:solidFill>
-            <a:round/>
-          </a:ln>
-        </p:spPr>
-        <p:txBody>
-          <a:bodyPr lIns="107640" rIns="63360" tIns="107640" bIns="63360" anchor="ctr"/>
-          <a:p>
-            <a:pPr algn="ctr">
-              <a:lnSpc>
-                <a:spcPct val="90000"/>
-              </a:lnSpc>
-            </a:pPr>
-            <a:r>
-              <a:rPr lang="en-US" sz="2500">
-                <a:solidFill>
-                  <a:srgbClr val="ffffff"/>
-                </a:solidFill>
-                <a:latin typeface="Calibri"/>
-              </a:rPr>
-              <a:t>Topic</a:t>
-            </a:r>
-            <a:endParaRPr/>
-          </a:p>
-        </p:txBody>
-      </p:sp>
-      <p:sp>
-        <p:nvSpPr>
-          <p:cNvPr id="96" name="CustomShape 9"/>
-          <p:cNvSpPr/>
-          <p:nvPr/>
-        </p:nvSpPr>
-        <p:spPr>
-          <a:xfrm rot="10800000">
-            <a:off x="4525920" y="3862800"/>
-            <a:ext cx="673560" cy="360"/>
-          </a:xfrm>
-          <a:prstGeom prst="rect">
-            <a:avLst/>
-          </a:prstGeom>
-          <a:noFill/>
-          <a:ln w="25560">
-            <a:solidFill>
-              <a:srgbClr val="71b6cc"/>
-            </a:solidFill>
-            <a:round/>
-          </a:ln>
-        </p:spPr>
-      </p:sp>
-      <p:sp>
-        <p:nvSpPr>
-          <p:cNvPr id="97" name="CustomShape 10"/>
-          <p:cNvSpPr/>
-          <p:nvPr/>
-        </p:nvSpPr>
-        <p:spPr>
-          <a:xfrm>
-            <a:off x="3615840" y="3408840"/>
-            <a:ext cx="909360" cy="909360"/>
-          </a:xfrm>
-          <a:prstGeom prst="roundRect">
-            <a:avLst>
-              <a:gd name="adj" fmla="val 16667"/>
-            </a:avLst>
-          </a:prstGeom>
-          <a:solidFill>
-            <a:srgbClr val="4bacc6"/>
-          </a:solidFill>
-          <a:ln w="25560">
-            <a:solidFill>
-              <a:srgbClr val="ffffff"/>
-            </a:solidFill>
-            <a:round/>
-          </a:ln>
-        </p:spPr>
-        <p:txBody>
-          <a:bodyPr lIns="84960" rIns="40680" tIns="84960" bIns="40680" anchor="ctr"/>
-          <a:p>
-            <a:pPr algn="ctr">
-              <a:lnSpc>
-                <a:spcPct val="90000"/>
-              </a:lnSpc>
-            </a:pPr>
-            <a:r>
-              <a:rPr lang="en-US" sz="1600">
-                <a:solidFill>
-                  <a:srgbClr val="ffffff"/>
-                </a:solidFill>
-                <a:latin typeface="Calibri"/>
-              </a:rPr>
-              <a:t>Location</a:t>
-            </a:r>
-            <a:endParaRPr/>
-          </a:p>
-        </p:txBody>
-      </p:sp>
-      <p:sp>
-        <p:nvSpPr>
-          <p:cNvPr id="98" name="CustomShape 11"/>
-          <p:cNvSpPr/>
-          <p:nvPr/>
-        </p:nvSpPr>
-        <p:spPr>
-          <a:xfrm>
-            <a:off x="824040" y="2621520"/>
-            <a:ext cx="2325600" cy="364680"/>
-          </a:xfrm>
-          <a:prstGeom prst="rect">
-            <a:avLst/>
-          </a:prstGeom>
-          <a:noFill/>
-          <a:ln>
-            <a:noFill/>
-          </a:ln>
-        </p:spPr>
-        <p:txBody>
-          <a:bodyPr wrap="none" lIns="90000" rIns="90000" tIns="45000" bIns="45000"/>
-          <a:p>
-            <a:pPr>
-              <a:lnSpc>
-                <a:spcPct val="100000"/>
-              </a:lnSpc>
-            </a:pPr>
-            <a:r>
-              <a:rPr lang="en-US">
-                <a:solidFill>
-                  <a:srgbClr val="000000"/>
-                </a:solidFill>
-                <a:latin typeface="Calibri"/>
-              </a:rPr>
-              <a:t>Location Hierarchy</a:t>
-            </a:r>
-            <a:endParaRPr/>
-          </a:p>
-        </p:txBody>
-      </p:sp>
-      <p:sp>
-        <p:nvSpPr>
-          <p:cNvPr id="99" name="CustomShape 12"/>
-          <p:cNvSpPr/>
-          <p:nvPr/>
-        </p:nvSpPr>
-        <p:spPr>
-          <a:xfrm flipH="1">
-            <a:off x="2112840" y="3855240"/>
-            <a:ext cx="1514520" cy="389880"/>
-          </a:xfrm>
-          <a:prstGeom prst="straightConnector1">
-            <a:avLst/>
-          </a:prstGeom>
-          <a:noFill/>
-          <a:ln w="25560">
-            <a:solidFill>
-              <a:srgbClr val="4bacc6"/>
-            </a:solidFill>
-            <a:round/>
-            <a:tailEnd len="med" type="arrow" w="med"/>
-          </a:ln>
-        </p:spPr>
-      </p:sp>
-      <p:sp>
-        <p:nvSpPr>
-          <p:cNvPr id="100" name="CustomShape 13"/>
-          <p:cNvSpPr/>
-          <p:nvPr/>
-        </p:nvSpPr>
-        <p:spPr>
-          <a:xfrm>
-            <a:off x="1870920" y="3465360"/>
-            <a:ext cx="91080" cy="385200"/>
-          </a:xfrm>
-          <a:prstGeom prst="rect">
-            <a:avLst/>
-          </a:prstGeom>
-          <a:noFill/>
-          <a:ln w="25560">
-            <a:solidFill>
-              <a:srgbClr val="c0504d"/>
-            </a:solidFill>
-            <a:round/>
-          </a:ln>
-        </p:spPr>
-      </p:sp>
-      <p:sp>
-        <p:nvSpPr>
-          <p:cNvPr id="101" name="CustomShape 14"/>
-          <p:cNvSpPr/>
-          <p:nvPr/>
-        </p:nvSpPr>
-        <p:spPr>
-          <a:xfrm>
-            <a:off x="2004840" y="3465360"/>
-            <a:ext cx="1013760" cy="770760"/>
-          </a:xfrm>
-          <a:prstGeom prst="rect">
-            <a:avLst/>
-          </a:prstGeom>
-          <a:noFill/>
-          <a:ln w="25560">
-            <a:solidFill>
-              <a:srgbClr val="c0504d"/>
-            </a:solidFill>
-            <a:round/>
-          </a:ln>
-        </p:spPr>
-      </p:sp>
-      <p:sp>
-        <p:nvSpPr>
-          <p:cNvPr id="102" name="CustomShape 15"/>
-          <p:cNvSpPr/>
-          <p:nvPr/>
-        </p:nvSpPr>
-        <p:spPr>
-          <a:xfrm>
-            <a:off x="1959120" y="3465360"/>
-            <a:ext cx="91080" cy="770760"/>
-          </a:xfrm>
-          <a:prstGeom prst="rect">
-            <a:avLst/>
-          </a:prstGeom>
-          <a:noFill/>
-          <a:ln w="25560">
-            <a:solidFill>
-              <a:srgbClr val="c0504d"/>
-            </a:solidFill>
-            <a:round/>
-          </a:ln>
-        </p:spPr>
-      </p:sp>
-      <p:sp>
-        <p:nvSpPr>
-          <p:cNvPr id="103" name="CustomShape 16"/>
-          <p:cNvSpPr/>
-          <p:nvPr/>
-        </p:nvSpPr>
-        <p:spPr>
-          <a:xfrm>
-            <a:off x="990720" y="3465360"/>
-            <a:ext cx="1013760" cy="770760"/>
-          </a:xfrm>
-          <a:prstGeom prst="rect">
-            <a:avLst/>
-          </a:prstGeom>
-          <a:noFill/>
-          <a:ln w="25560">
-            <a:solidFill>
-              <a:srgbClr val="c0504d"/>
-            </a:solidFill>
-            <a:round/>
-          </a:ln>
-        </p:spPr>
-      </p:sp>
-      <p:sp>
-        <p:nvSpPr>
-          <p:cNvPr id="104" name="CustomShape 17"/>
-          <p:cNvSpPr/>
-          <p:nvPr/>
-        </p:nvSpPr>
-        <p:spPr>
-          <a:xfrm>
-            <a:off x="1585800" y="3046320"/>
-            <a:ext cx="837720" cy="418680"/>
-          </a:xfrm>
-          <a:prstGeom prst="rect">
-            <a:avLst/>
-          </a:prstGeom>
-          <a:solidFill>
-            <a:srgbClr val="4f81bd"/>
-          </a:solidFill>
-          <a:ln w="25560">
-            <a:solidFill>
-              <a:srgbClr val="ffffff"/>
-            </a:solidFill>
-            <a:round/>
-          </a:ln>
-        </p:spPr>
-        <p:txBody>
-          <a:bodyPr lIns="9000" rIns="9000" tIns="9000" bIns="9000" anchor="ctr"/>
-          <a:p>
-            <a:pPr algn="ctr">
-              <a:lnSpc>
-                <a:spcPct val="90000"/>
-              </a:lnSpc>
-            </a:pPr>
-            <a:r>
-              <a:rPr lang="en-US" sz="1400">
-                <a:solidFill>
-                  <a:srgbClr val="ffffff"/>
-                </a:solidFill>
-                <a:latin typeface="Calibri"/>
-              </a:rPr>
-              <a:t>root</a:t>
-            </a:r>
-            <a:endParaRPr/>
-          </a:p>
-        </p:txBody>
-      </p:sp>
-      <p:sp>
-        <p:nvSpPr>
-          <p:cNvPr id="105" name="CustomShape 18"/>
-          <p:cNvSpPr/>
-          <p:nvPr/>
-        </p:nvSpPr>
-        <p:spPr>
-          <a:xfrm>
-            <a:off x="571680" y="4236480"/>
-            <a:ext cx="837720" cy="418680"/>
-          </a:xfrm>
-          <a:prstGeom prst="rect">
-            <a:avLst/>
-          </a:prstGeom>
-          <a:solidFill>
-            <a:srgbClr val="c0504d"/>
-          </a:solidFill>
-          <a:ln w="25560">
-            <a:solidFill>
-              <a:srgbClr val="ffffff"/>
-            </a:solidFill>
-            <a:round/>
-          </a:ln>
-        </p:spPr>
-        <p:txBody>
-          <a:bodyPr lIns="9000" rIns="9000" tIns="9000" bIns="9000" anchor="ctr"/>
-          <a:p>
-            <a:pPr algn="ctr">
-              <a:lnSpc>
-                <a:spcPct val="90000"/>
-              </a:lnSpc>
-            </a:pPr>
-            <a:r>
-              <a:rPr lang="en-US" sz="1400">
-                <a:solidFill>
-                  <a:srgbClr val="ffffff"/>
-                </a:solidFill>
-                <a:latin typeface="Calibri"/>
-              </a:rPr>
-              <a:t>India</a:t>
-            </a:r>
-            <a:endParaRPr/>
-          </a:p>
-        </p:txBody>
-      </p:sp>
-      <p:sp>
-        <p:nvSpPr>
-          <p:cNvPr id="106" name="CustomShape 19"/>
-          <p:cNvSpPr/>
-          <p:nvPr/>
-        </p:nvSpPr>
-        <p:spPr>
-          <a:xfrm>
-            <a:off x="1585800" y="4236480"/>
-            <a:ext cx="837720" cy="418680"/>
-          </a:xfrm>
-          <a:prstGeom prst="rect">
-            <a:avLst/>
-          </a:prstGeom>
-          <a:solidFill>
-            <a:srgbClr val="c0504d"/>
-          </a:solidFill>
-          <a:ln w="25560">
-            <a:solidFill>
-              <a:srgbClr val="ffffff"/>
-            </a:solidFill>
-            <a:round/>
-          </a:ln>
-        </p:spPr>
-        <p:txBody>
-          <a:bodyPr lIns="9000" rIns="9000" tIns="9000" bIns="9000" anchor="ctr"/>
-          <a:p>
-            <a:pPr algn="ctr">
-              <a:lnSpc>
-                <a:spcPct val="90000"/>
-              </a:lnSpc>
-            </a:pPr>
-            <a:r>
-              <a:rPr lang="en-US" sz="1400">
-                <a:solidFill>
-                  <a:srgbClr val="ffffff"/>
-                </a:solidFill>
-                <a:latin typeface="Calibri"/>
-              </a:rPr>
-              <a:t>South Korea</a:t>
-            </a:r>
-            <a:endParaRPr/>
-          </a:p>
-        </p:txBody>
-      </p:sp>
-      <p:sp>
-        <p:nvSpPr>
-          <p:cNvPr id="107" name="CustomShape 20"/>
-          <p:cNvSpPr/>
-          <p:nvPr/>
-        </p:nvSpPr>
-        <p:spPr>
-          <a:xfrm>
-            <a:off x="2599920" y="4236480"/>
-            <a:ext cx="837720" cy="418680"/>
-          </a:xfrm>
-          <a:prstGeom prst="rect">
-            <a:avLst/>
-          </a:prstGeom>
-          <a:solidFill>
-            <a:srgbClr val="c0504d"/>
-          </a:solidFill>
-          <a:ln w="25560">
-            <a:solidFill>
-              <a:srgbClr val="ffffff"/>
-            </a:solidFill>
-            <a:round/>
-          </a:ln>
-        </p:spPr>
-        <p:txBody>
-          <a:bodyPr lIns="9000" rIns="9000" tIns="9000" bIns="9000" anchor="ctr"/>
-          <a:p>
-            <a:pPr algn="ctr">
-              <a:lnSpc>
-                <a:spcPct val="90000"/>
-              </a:lnSpc>
-            </a:pPr>
-            <a:r>
-              <a:rPr lang="en-US" sz="1400">
-                <a:solidFill>
-                  <a:srgbClr val="ffffff"/>
-                </a:solidFill>
-                <a:latin typeface="Calibri"/>
-              </a:rPr>
-              <a:t>Gaza Strip</a:t>
-            </a:r>
-            <a:endParaRPr/>
-          </a:p>
-        </p:txBody>
-      </p:sp>
-      <p:sp>
-        <p:nvSpPr>
-          <p:cNvPr id="108" name="CustomShape 21"/>
-          <p:cNvSpPr/>
-          <p:nvPr/>
-        </p:nvSpPr>
-        <p:spPr>
-          <a:xfrm>
-            <a:off x="1078560" y="3641400"/>
-            <a:ext cx="837720" cy="418680"/>
-          </a:xfrm>
-          <a:prstGeom prst="rect">
-            <a:avLst/>
-          </a:prstGeom>
-          <a:solidFill>
-            <a:srgbClr val="c0504d"/>
-          </a:solidFill>
-          <a:ln w="25560">
-            <a:solidFill>
-              <a:srgbClr val="ffffff"/>
-            </a:solidFill>
-            <a:round/>
-          </a:ln>
-        </p:spPr>
-        <p:txBody>
-          <a:bodyPr lIns="9000" rIns="9000" tIns="9000" bIns="9000" anchor="ctr"/>
-          <a:p>
-            <a:pPr algn="ctr">
-              <a:lnSpc>
-                <a:spcPct val="90000"/>
-              </a:lnSpc>
-            </a:pPr>
-            <a:r>
-              <a:rPr lang="en-US" sz="1400">
-                <a:solidFill>
-                  <a:srgbClr val="ffffff"/>
-                </a:solidFill>
-                <a:latin typeface="Calibri"/>
-              </a:rPr>
-              <a:t>Asia</a:t>
-            </a:r>
-            <a:endParaRPr/>
-          </a:p>
-        </p:txBody>
-      </p:sp>
+        </p:nvPicPr>
+        <p:blipFill>
+          <a:blip r:embed="rId2">
+            <a:extLst>
+              <a:ext uri="{28A0092B-C50C-407E-A947-70E740481C1C}">
+                <a14:useLocalDpi xmlns:a14="http://schemas.microsoft.com/office/drawing/2010/main" val="0"/>
+              </a:ext>
+            </a:extLst>
+          </a:blip>
+          <a:stretch>
+            <a:fillRect/>
+          </a:stretch>
+        </p:blipFill>
+        <p:spPr>
+          <a:xfrm>
+            <a:off x="0" y="1309129"/>
+            <a:ext cx="9144000" cy="5273885"/>
+          </a:xfrm>
+          <a:prstGeom prst="rect">
+            <a:avLst/>
+          </a:prstGeom>
+        </p:spPr>
+      </p:pic>
     </p:spTree>
   </p:cSld>
+  <p:clrMapOvr>
+    <a:masterClrMapping/>
+  </p:clrMapOvr>
   <p:timing>
     <p:tnLst>
       <p:par>
-        <p:cTn id="11" dur="indefinite" restart="never" nodeType="tmRoot">
+        <p:cTn xmlns:p14="http://schemas.microsoft.com/office/powerpoint/2010/main" id="1" dur="indefinite" restart="never" nodeType="tmRoot">
           <p:childTnLst>
             <p:seq>
-              <p:cTn id="12" nodeType="mainSeq"/>
+              <p:cTn id="2" nodeType="mainSeq"/>
               <p:prevCondLst>
-                <p:cond delay="0" evt="onPrev">
+                <p:cond evt="onPrev" delay="0">
                   <p:tgtEl>
                     <p:sldTgt/>
                   </p:tgtEl>
                 </p:cond>
               </p:prevCondLst>
               <p:nextCondLst>
-                <p:cond delay="0" evt="onNext">
+                <p:cond evt="onNext" delay="0">
                   <p:tgtEl>
                     <p:sldTgt/>
                   </p:tgtEl>
@@ -5718,7 +5464,7 @@
 </file>
 
 <file path=ppt/slides/slide7.xml><?xml version="1.0" encoding="utf-8"?>
-<p:sld xmlns:a="http://schemas.openxmlformats.org/drawingml/2006/main" xmlns:p="http://schemas.openxmlformats.org/presentationml/2006/main" xmlns:r="http://schemas.openxmlformats.org/officeDocument/2006/relationships">
+<p:sld xmlns:a="http://schemas.openxmlformats.org/drawingml/2006/main" xmlns:r="http://schemas.openxmlformats.org/officeDocument/2006/relationships" xmlns:p="http://schemas.openxmlformats.org/presentationml/2006/main">
   <p:cSld>
     <p:spTree>
       <p:nvGrpSpPr>
@@ -5751,22 +5497,14 @@
         </p:spPr>
         <p:txBody>
           <a:bodyPr anchor="ctr"/>
+          <a:lstStyle/>
           <a:p>
             <a:pPr algn="ctr">
               <a:lnSpc>
                 <a:spcPct val="100000"/>
               </a:lnSpc>
             </a:pPr>
-            <a:r>
-              <a:rPr lang="en-US" sz="4400">
-                <a:solidFill>
-                  <a:srgbClr val="000000"/>
-                </a:solidFill>
-                <a:latin typeface="Calibri"/>
-              </a:rPr>
-              <a:t>Contribution: Better Storage</a:t>
-            </a:r>
-            <a:endParaRPr/>
+            <a:endParaRPr dirty="0"/>
           </a:p>
         </p:txBody>
       </p:sp>
@@ -5787,62 +5525,147 @@
         </p:spPr>
         <p:txBody>
           <a:bodyPr/>
+          <a:lstStyle/>
+          <a:p>
+            <a:pPr>
+              <a:buSzPct val="25000"/>
+            </a:pPr>
+            <a:endParaRPr lang="en-US" dirty="0" smtClean="0"/>
+          </a:p>
           <a:p>
             <a:pPr>
               <a:buSzPct val="25000"/>
               <a:buFont typeface="StarSymbol"/>
               <a:buChar char=""/>
             </a:pPr>
-            <a:r>
-              <a:rPr lang="en-US"/>
-              <a:t>Build a hash-table with k=(node1, node2), v=set of meta-paths</a:t>
-            </a:r>
-            <a:endParaRPr/>
-          </a:p>
-          <a:p>
-            <a:pPr>
-              <a:buSzPct val="25000"/>
-              <a:buFont typeface="StarSymbol"/>
-              <a:buChar char=""/>
-            </a:pPr>
-            <a:r>
-              <a:rPr lang="en-US"/>
+            <a:endParaRPr lang="en-US" dirty="0"/>
+          </a:p>
+        </p:txBody>
+      </p:sp>
+      <p:sp>
+        <p:nvSpPr>
+          <p:cNvPr id="5" name="Text Placeholder 4"/>
+          <p:cNvSpPr>
+            <a:spLocks noGrp="1"/>
+          </p:cNvSpPr>
+          <p:nvPr>
+            <p:ph type="body"/>
+          </p:nvPr>
+        </p:nvSpPr>
+        <p:spPr/>
+        <p:txBody>
+          <a:bodyPr/>
+          <a:lstStyle/>
+          <a:p>
+            <a:pPr marL="457200" indent="-457200">
+              <a:buFont typeface="Arial"/>
+              <a:buChar char="•"/>
+            </a:pPr>
+            <a:r>
+              <a:rPr lang="en-US" sz="3200" dirty="0" smtClean="0"/>
+              <a:t>Build a hash-table with k = (node1, node)</a:t>
+            </a:r>
+            <a:br>
+              <a:rPr lang="en-US" sz="3200" dirty="0" smtClean="0"/>
+            </a:br>
+            <a:r>
+              <a:rPr lang="en-US" sz="3200" dirty="0" smtClean="0"/>
+              <a:t>v = set of meta-paths</a:t>
+            </a:r>
+            <a:br>
+              <a:rPr lang="en-US" sz="3200" dirty="0" smtClean="0"/>
+            </a:br>
+            <a:endParaRPr lang="en-US" sz="3200" dirty="0" smtClean="0"/>
+          </a:p>
+          <a:p>
+            <a:pPr marL="457200" indent="-457200">
+              <a:buFont typeface="Arial"/>
+              <a:buChar char="•"/>
+            </a:pPr>
+            <a:r>
+              <a:rPr lang="en-US" sz="3200" dirty="0" smtClean="0"/>
               <a:t>Start with empty hash-table</a:t>
             </a:r>
-            <a:endParaRPr/>
-          </a:p>
-          <a:p>
-            <a:pPr>
-              <a:buSzPct val="25000"/>
-              <a:buFont typeface="StarSymbol"/>
-              <a:buChar char=""/>
-            </a:pPr>
-            <a:r>
-              <a:rPr lang="en-US"/>
-              <a:t>Cached as user issues similarity search queries</a:t>
-            </a:r>
-            <a:endParaRPr/>
+            <a:br>
+              <a:rPr lang="en-US" sz="3200" dirty="0" smtClean="0"/>
+            </a:br>
+            <a:endParaRPr lang="en-US" sz="3200" dirty="0" smtClean="0"/>
+          </a:p>
+          <a:p>
+            <a:pPr marL="457200" indent="-457200">
+              <a:buFont typeface="Arial"/>
+              <a:buChar char="•"/>
+            </a:pPr>
+            <a:r>
+              <a:rPr lang="en-US" sz="3200" dirty="0" smtClean="0"/>
+              <a:t>Caches as user issues similarity search</a:t>
+            </a:r>
+            <a:br>
+              <a:rPr lang="en-US" sz="3200" dirty="0" smtClean="0"/>
+            </a:br>
+            <a:r>
+              <a:rPr lang="en-US" sz="3200" dirty="0" smtClean="0"/>
+              <a:t>queries.</a:t>
+            </a:r>
+            <a:endParaRPr lang="en-US" sz="3200" dirty="0"/>
+          </a:p>
+        </p:txBody>
+      </p:sp>
+      <p:sp>
+        <p:nvSpPr>
+          <p:cNvPr id="4" name="Title 3"/>
+          <p:cNvSpPr>
+            <a:spLocks noGrp="1"/>
+          </p:cNvSpPr>
+          <p:nvPr>
+            <p:ph type="title"/>
+          </p:nvPr>
+        </p:nvSpPr>
+        <p:spPr>
+          <a:xfrm>
+            <a:off x="457200" y="274320"/>
+            <a:ext cx="8229240" cy="1143000"/>
+          </a:xfrm>
+        </p:spPr>
+        <p:txBody>
+          <a:bodyPr/>
+          <a:lstStyle/>
+          <a:p>
+            <a:r>
+              <a:rPr lang="en-US" sz="4400" dirty="0" smtClean="0">
+                <a:latin typeface="Calibri"/>
+                <a:cs typeface="Calibri"/>
+              </a:rPr>
+              <a:t>Contribution: Better Storage</a:t>
+            </a:r>
+            <a:endParaRPr lang="en-US" sz="4400" dirty="0">
+              <a:latin typeface="Calibri"/>
+              <a:cs typeface="Calibri"/>
+            </a:endParaRPr>
           </a:p>
         </p:txBody>
       </p:sp>
     </p:spTree>
   </p:cSld>
+  <p:clrMapOvr>
+    <a:masterClrMapping/>
+  </p:clrMapOvr>
   <p:timing>
     <p:tnLst>
       <p:par>
-        <p:cTn id="13" dur="indefinite" restart="never" nodeType="tmRoot">
+        <p:cTn xmlns:p14="http://schemas.microsoft.com/office/powerpoint/2010/main" id="1" dur="indefinite" restart="never" nodeType="tmRoot">
           <p:childTnLst>
             <p:seq>
-              <p:cTn id="14" nodeType="mainSeq"/>
+              <p:cTn id="2" nodeType="mainSeq"/>
               <p:prevCondLst>
-                <p:cond delay="0" evt="onPrev">
+                <p:cond evt="onPrev" delay="0">
                   <p:tgtEl>
                     <p:sldTgt/>
                   </p:tgtEl>
                 </p:cond>
               </p:prevCondLst>
               <p:nextCondLst>
-                <p:cond delay="0" evt="onNext">
+                <p:cond evt="onNext" delay="0">
                   <p:tgtEl>
                     <p:sldTgt/>
                   </p:tgtEl>
@@ -5858,7 +5681,7 @@
 </file>
 
 <file path=ppt/slides/slide8.xml><?xml version="1.0" encoding="utf-8"?>
-<p:sld xmlns:a="http://schemas.openxmlformats.org/drawingml/2006/main" xmlns:p="http://schemas.openxmlformats.org/presentationml/2006/main" xmlns:r="http://schemas.openxmlformats.org/officeDocument/2006/relationships">
+<p:sld xmlns:a="http://schemas.openxmlformats.org/drawingml/2006/main" xmlns:r="http://schemas.openxmlformats.org/officeDocument/2006/relationships" xmlns:p="http://schemas.openxmlformats.org/presentationml/2006/main">
   <p:cSld>
     <p:spTree>
       <p:nvGrpSpPr>
@@ -5891,6 +5714,7 @@
         </p:spPr>
         <p:txBody>
           <a:bodyPr anchor="ctr"/>
+          <a:lstStyle/>
           <a:p>
             <a:pPr algn="ctr">
               <a:lnSpc>
@@ -5927,6 +5751,7 @@
         </p:spPr>
         <p:txBody>
           <a:bodyPr/>
+          <a:lstStyle/>
           <a:p>
             <a:pPr>
               <a:lnSpc>
@@ -5936,7 +5761,7 @@
               <a:buChar char="•"/>
             </a:pPr>
             <a:r>
-              <a:rPr lang="en-US" sz="3200">
+              <a:rPr lang="en-US" sz="3200" dirty="0">
                 <a:solidFill>
                   <a:srgbClr val="000000"/>
                 </a:solidFill>
@@ -5944,7 +5769,7 @@
               </a:rPr>
               <a:t>Build a forest of hierarchical trees</a:t>
             </a:r>
-            <a:endParaRPr/>
+            <a:endParaRPr dirty="0"/>
           </a:p>
           <a:p>
             <a:pPr lvl="1">
@@ -5955,15 +5780,24 @@
               <a:buChar char="–"/>
             </a:pPr>
             <a:r>
-              <a:rPr lang="en-US" sz="2800">
-                <a:solidFill>
-                  <a:srgbClr val="000000"/>
-                </a:solidFill>
-                <a:latin typeface="Calibri"/>
-              </a:rPr>
-              <a:t>Hashtable to allow fast lookup of a category in the tree.</a:t>
-            </a:r>
-            <a:endParaRPr/>
+              <a:rPr lang="en-US" sz="2800" dirty="0" err="1">
+                <a:solidFill>
+                  <a:srgbClr val="000000"/>
+                </a:solidFill>
+                <a:latin typeface="Calibri"/>
+              </a:rPr>
+              <a:t>Hashtable</a:t>
+            </a:r>
+            <a:r>
+              <a:rPr lang="en-US" sz="2800" dirty="0">
+                <a:solidFill>
+                  <a:srgbClr val="000000"/>
+                </a:solidFill>
+                <a:latin typeface="Calibri"/>
+              </a:rPr>
+              <a:t> to allow fast lookup of a category in the tree.</a:t>
+            </a:r>
+            <a:endParaRPr dirty="0"/>
           </a:p>
           <a:p>
             <a:pPr lvl="1">
@@ -5974,7 +5808,7 @@
               <a:buChar char="–"/>
             </a:pPr>
             <a:r>
-              <a:rPr lang="en-US" sz="2800">
+              <a:rPr lang="en-US" sz="2800" dirty="0">
                 <a:solidFill>
                   <a:srgbClr val="000000"/>
                 </a:solidFill>
@@ -5982,7 +5816,7 @@
               </a:rPr>
               <a:t>Iterative DFS for roll-up and drill-down operations on the tree.</a:t>
             </a:r>
-            <a:endParaRPr/>
+            <a:endParaRPr dirty="0"/>
           </a:p>
           <a:p>
             <a:pPr>
@@ -5993,7 +5827,7 @@
               <a:buChar char="•"/>
             </a:pPr>
             <a:r>
-              <a:rPr lang="en-US" sz="3200">
+              <a:rPr lang="en-US" sz="3200" dirty="0">
                 <a:solidFill>
                   <a:srgbClr val="000000"/>
                 </a:solidFill>
@@ -6002,7 +5836,7 @@
               <a:t>5 operations, </a:t>
             </a:r>
             <a:r>
-              <a:rPr i="1" lang="en-US" sz="3200">
+              <a:rPr lang="en-US" sz="3200" i="1" dirty="0">
                 <a:solidFill>
                   <a:srgbClr val="000000"/>
                 </a:solidFill>
@@ -6011,7 +5845,7 @@
               <a:t>N</a:t>
             </a:r>
             <a:r>
-              <a:rPr lang="en-US" sz="3200">
+              <a:rPr lang="en-US" sz="3200" dirty="0">
                 <a:solidFill>
                   <a:srgbClr val="000000"/>
                 </a:solidFill>
@@ -6019,7 +5853,7 @@
               </a:rPr>
               <a:t> is number of nodes in tree:</a:t>
             </a:r>
-            <a:endParaRPr/>
+            <a:endParaRPr dirty="0"/>
           </a:p>
           <a:p>
             <a:pPr lvl="1">
@@ -6030,51 +5864,42 @@
               <a:buChar char="–"/>
             </a:pPr>
             <a:r>
-              <a:rPr lang="en-US" sz="2800">
-                <a:solidFill>
-                  <a:srgbClr val="000000"/>
-                </a:solidFill>
-                <a:latin typeface="Calibri"/>
-              </a:rPr>
-              <a:t>is_member() O(N)</a:t>
-            </a:r>
-            <a:r>
-              <a:rPr lang="en-US" sz="2800">
-                <a:solidFill>
-                  <a:srgbClr val="000000"/>
-                </a:solidFill>
-                <a:latin typeface="Calibri"/>
-              </a:rPr>
-              <a:t>	</a:t>
-            </a:r>
-            <a:r>
-              <a:rPr lang="en-US" sz="2800">
-                <a:solidFill>
-                  <a:srgbClr val="000000"/>
-                </a:solidFill>
-                <a:latin typeface="Calibri"/>
-              </a:rPr>
-              <a:t>	</a:t>
-            </a:r>
-            <a:r>
-              <a:rPr lang="en-US" sz="2800">
-                <a:solidFill>
-                  <a:srgbClr val="000000"/>
-                </a:solidFill>
-                <a:latin typeface="Calibri"/>
-              </a:rPr>
-              <a:t>	</a:t>
-            </a:r>
-            <a:r>
-              <a:rPr lang="en-US" sz="2800">
-                <a:solidFill>
-                  <a:srgbClr val="000000"/>
-                </a:solidFill>
-                <a:latin typeface="Calibri"/>
-              </a:rPr>
-              <a:t>- is_slice() O(1)</a:t>
-            </a:r>
-            <a:endParaRPr/>
+              <a:rPr lang="en-US" sz="2800" dirty="0" err="1">
+                <a:solidFill>
+                  <a:srgbClr val="000000"/>
+                </a:solidFill>
+                <a:latin typeface="Calibri"/>
+              </a:rPr>
+              <a:t>is_member</a:t>
+            </a:r>
+            <a:r>
+              <a:rPr lang="en-US" sz="2800" dirty="0">
+                <a:solidFill>
+                  <a:srgbClr val="000000"/>
+                </a:solidFill>
+                <a:latin typeface="Calibri"/>
+              </a:rPr>
+              <a:t>() O(N)			- </a:t>
+            </a:r>
+            <a:r>
+              <a:rPr lang="en-US" sz="2800" dirty="0" err="1">
+                <a:solidFill>
+                  <a:srgbClr val="000000"/>
+                </a:solidFill>
+                <a:latin typeface="Calibri"/>
+              </a:rPr>
+              <a:t>is_slice</a:t>
+            </a:r>
+            <a:r>
+              <a:rPr lang="en-US" sz="2800" dirty="0">
+                <a:solidFill>
+                  <a:srgbClr val="000000"/>
+                </a:solidFill>
+                <a:latin typeface="Calibri"/>
+              </a:rPr>
+              <a:t>() O(1)</a:t>
+            </a:r>
+            <a:endParaRPr dirty="0"/>
           </a:p>
           <a:p>
             <a:pPr lvl="1">
@@ -6085,42 +5910,42 @@
               <a:buChar char="–"/>
             </a:pPr>
             <a:r>
-              <a:rPr lang="en-US" sz="2800">
-                <a:solidFill>
-                  <a:srgbClr val="000000"/>
-                </a:solidFill>
-                <a:latin typeface="Calibri"/>
-              </a:rPr>
-              <a:t>get_categories() O(N)</a:t>
-            </a:r>
-            <a:r>
-              <a:rPr lang="en-US" sz="2800">
-                <a:solidFill>
-                  <a:srgbClr val="000000"/>
-                </a:solidFill>
-                <a:latin typeface="Calibri"/>
-              </a:rPr>
-              <a:t>	</a:t>
-            </a:r>
-            <a:r>
-              <a:rPr lang="en-US" sz="2800">
-                <a:solidFill>
-                  <a:srgbClr val="000000"/>
-                </a:solidFill>
-                <a:latin typeface="Calibri"/>
-              </a:rPr>
-              <a:t>	</a:t>
-            </a:r>
-            <a:r>
-              <a:rPr lang="en-US" sz="2800">
-                <a:solidFill>
-                  <a:srgbClr val="000000"/>
-                </a:solidFill>
-                <a:latin typeface="Calibri"/>
-              </a:rPr>
-              <a:t>- get_children() O(1)</a:t>
-            </a:r>
-            <a:endParaRPr/>
+              <a:rPr lang="en-US" sz="2800" dirty="0" err="1">
+                <a:solidFill>
+                  <a:srgbClr val="000000"/>
+                </a:solidFill>
+                <a:latin typeface="Calibri"/>
+              </a:rPr>
+              <a:t>get_categories</a:t>
+            </a:r>
+            <a:r>
+              <a:rPr lang="en-US" sz="2800" dirty="0">
+                <a:solidFill>
+                  <a:srgbClr val="000000"/>
+                </a:solidFill>
+                <a:latin typeface="Calibri"/>
+              </a:rPr>
+              <a:t>() O(N)		- </a:t>
+            </a:r>
+            <a:r>
+              <a:rPr lang="en-US" sz="2800" dirty="0" err="1">
+                <a:solidFill>
+                  <a:srgbClr val="000000"/>
+                </a:solidFill>
+                <a:latin typeface="Calibri"/>
+              </a:rPr>
+              <a:t>get_children</a:t>
+            </a:r>
+            <a:r>
+              <a:rPr lang="en-US" sz="2800" dirty="0">
+                <a:solidFill>
+                  <a:srgbClr val="000000"/>
+                </a:solidFill>
+                <a:latin typeface="Calibri"/>
+              </a:rPr>
+              <a:t>() O(1)</a:t>
+            </a:r>
+            <a:endParaRPr dirty="0"/>
           </a:p>
           <a:p>
             <a:pPr lvl="1">
@@ -6131,36 +5956,48 @@
               <a:buChar char="–"/>
             </a:pPr>
             <a:r>
-              <a:rPr lang="en-US" sz="2800">
-                <a:solidFill>
-                  <a:srgbClr val="000000"/>
-                </a:solidFill>
-                <a:latin typeface="Calibri"/>
-              </a:rPr>
-              <a:t>get_parent() O(1)</a:t>
-            </a:r>
-            <a:endParaRPr/>
+              <a:rPr lang="en-US" sz="2800" dirty="0" err="1">
+                <a:solidFill>
+                  <a:srgbClr val="000000"/>
+                </a:solidFill>
+                <a:latin typeface="Calibri"/>
+              </a:rPr>
+              <a:t>get_parent</a:t>
+            </a:r>
+            <a:r>
+              <a:rPr lang="en-US" sz="2800" dirty="0">
+                <a:solidFill>
+                  <a:srgbClr val="000000"/>
+                </a:solidFill>
+                <a:latin typeface="Calibri"/>
+              </a:rPr>
+              <a:t>() O(1)</a:t>
+            </a:r>
+            <a:endParaRPr dirty="0"/>
           </a:p>
         </p:txBody>
       </p:sp>
     </p:spTree>
   </p:cSld>
+  <p:clrMapOvr>
+    <a:masterClrMapping/>
+  </p:clrMapOvr>
   <p:timing>
     <p:tnLst>
       <p:par>
-        <p:cTn id="15" dur="indefinite" restart="never" nodeType="tmRoot">
+        <p:cTn xmlns:p14="http://schemas.microsoft.com/office/powerpoint/2010/main" id="1" dur="indefinite" restart="never" nodeType="tmRoot">
           <p:childTnLst>
             <p:seq>
-              <p:cTn id="16" nodeType="mainSeq"/>
+              <p:cTn id="2" nodeType="mainSeq"/>
               <p:prevCondLst>
-                <p:cond delay="0" evt="onPrev">
+                <p:cond evt="onPrev" delay="0">
                   <p:tgtEl>
                     <p:sldTgt/>
                   </p:tgtEl>
                 </p:cond>
               </p:prevCondLst>
               <p:nextCondLst>
-                <p:cond delay="0" evt="onNext">
+                <p:cond evt="onNext" delay="0">
                   <p:tgtEl>
                     <p:sldTgt/>
                   </p:tgtEl>
@@ -6176,7 +6013,7 @@
 </file>
 
 <file path=ppt/slides/slide9.xml><?xml version="1.0" encoding="utf-8"?>
-<p:sld xmlns:a="http://schemas.openxmlformats.org/drawingml/2006/main" xmlns:p="http://schemas.openxmlformats.org/presentationml/2006/main" xmlns:r="http://schemas.openxmlformats.org/officeDocument/2006/relationships">
+<p:sld xmlns:a="http://schemas.openxmlformats.org/drawingml/2006/main" xmlns:r="http://schemas.openxmlformats.org/officeDocument/2006/relationships" xmlns:p="http://schemas.openxmlformats.org/presentationml/2006/main">
   <p:cSld>
     <p:spTree>
       <p:nvGrpSpPr>
@@ -6209,6 +6046,7 @@
         </p:spPr>
         <p:txBody>
           <a:bodyPr anchor="ctr"/>
+          <a:lstStyle/>
           <a:p>
             <a:pPr algn="ctr">
               <a:lnSpc>
@@ -6216,7 +6054,7 @@
               </a:lnSpc>
             </a:pPr>
             <a:r>
-              <a:rPr lang="en-US" sz="4400">
+              <a:rPr lang="en-US" sz="4400" dirty="0">
                 <a:solidFill>
                   <a:srgbClr val="000000"/>
                 </a:solidFill>
@@ -6224,7 +6062,7 @@
               </a:rPr>
               <a:t>Contribution: User-Specified Constraints</a:t>
             </a:r>
-            <a:endParaRPr/>
+            <a:endParaRPr dirty="0"/>
           </a:p>
         </p:txBody>
       </p:sp>
@@ -6245,98 +6083,159 @@
         </p:spPr>
         <p:txBody>
           <a:bodyPr/>
+          <a:lstStyle/>
           <a:p>
             <a:pPr>
               <a:buSzPct val="25000"/>
-              <a:buFont typeface="StarSymbol"/>
-              <a:buChar char=""/>
-            </a:pPr>
-            <a:r>
-              <a:rPr lang="en-US"/>
-              <a:t>Two types of constraints: Must-Have and Must-Not Have</a:t>
-            </a:r>
-            <a:endParaRPr/>
-          </a:p>
-          <a:p>
-            <a:pPr lvl="1">
-              <a:buSzPct val="25000"/>
-              <a:buFont typeface="StarSymbol"/>
-              <a:buChar char=""/>
-            </a:pPr>
-            <a:r>
-              <a:rPr lang="en-US"/>
-              <a:t>Modify BFS to handle constraints</a:t>
-            </a:r>
-            <a:endParaRPr/>
-          </a:p>
-          <a:p>
-            <a:pPr>
-              <a:buSzPct val="25000"/>
-              <a:buFont typeface="StarSymbol"/>
-              <a:buChar char=""/>
-            </a:pPr>
-            <a:r>
-              <a:rPr lang="en-US"/>
-              <a:t>Must-Not-Have</a:t>
-            </a:r>
-            <a:endParaRPr/>
-          </a:p>
-          <a:p>
-            <a:pPr lvl="1">
-              <a:buSzPct val="25000"/>
-              <a:buFont typeface="StarSymbol"/>
-              <a:buChar char=""/>
-            </a:pPr>
-            <a:r>
-              <a:rPr lang="en-US"/>
-              <a:t>Enforced every time a new partial path is explored</a:t>
-            </a:r>
-            <a:endParaRPr/>
-          </a:p>
-          <a:p>
-            <a:pPr>
-              <a:buSzPct val="25000"/>
-              <a:buFont typeface="StarSymbol"/>
-              <a:buChar char=""/>
-            </a:pPr>
-            <a:r>
-              <a:rPr lang="en-US"/>
-              <a:t>Must-Have</a:t>
-            </a:r>
-            <a:endParaRPr/>
-          </a:p>
-          <a:p>
-            <a:pPr lvl="1">
-              <a:buSzPct val="25000"/>
-              <a:buFont typeface="StarSymbol"/>
-              <a:buChar char=""/>
-            </a:pPr>
-            <a:r>
-              <a:rPr lang="en-US"/>
-              <a:t>Enforced every time a new complete path is about to be added to the meta-path set</a:t>
-            </a:r>
-            <a:endParaRPr/>
+            </a:pPr>
+            <a:endParaRPr lang="en-US" sz="3200" dirty="0">
+              <a:latin typeface="Calibri"/>
+              <a:cs typeface="Calibri"/>
+            </a:endParaRPr>
+          </a:p>
+        </p:txBody>
+      </p:sp>
+      <p:sp>
+        <p:nvSpPr>
+          <p:cNvPr id="4" name="Text Placeholder 3"/>
+          <p:cNvSpPr>
+            <a:spLocks noGrp="1"/>
+          </p:cNvSpPr>
+          <p:nvPr>
+            <p:ph type="body"/>
+          </p:nvPr>
+        </p:nvSpPr>
+        <p:spPr/>
+        <p:txBody>
+          <a:bodyPr/>
+          <a:lstStyle/>
+          <a:p>
+            <a:pPr marL="457200" indent="-457200">
+              <a:buFont typeface="Arial"/>
+              <a:buChar char="•"/>
+            </a:pPr>
+            <a:r>
+              <a:rPr lang="en-US" sz="3200" dirty="0" smtClean="0">
+                <a:latin typeface="Calibri"/>
+                <a:cs typeface="Calibri"/>
+              </a:rPr>
+              <a:t>Two types of constraints: must-link and </a:t>
+            </a:r>
+            <a:br>
+              <a:rPr lang="en-US" sz="3200" dirty="0" smtClean="0">
+                <a:latin typeface="Calibri"/>
+                <a:cs typeface="Calibri"/>
+              </a:rPr>
+            </a:br>
+            <a:r>
+              <a:rPr lang="en-US" sz="3200" dirty="0" smtClean="0">
+                <a:latin typeface="Calibri"/>
+                <a:cs typeface="Calibri"/>
+              </a:rPr>
+              <a:t>cannot link.</a:t>
+            </a:r>
+          </a:p>
+          <a:p>
+            <a:pPr marL="457200" indent="-457200">
+              <a:buFont typeface="Arial"/>
+              <a:buChar char="•"/>
+            </a:pPr>
+            <a:r>
+              <a:rPr lang="en-US" sz="3200" dirty="0" smtClean="0">
+                <a:latin typeface="Calibri"/>
+                <a:cs typeface="Calibri"/>
+              </a:rPr>
+              <a:t>Modified BFS to handle constraints.</a:t>
+            </a:r>
+          </a:p>
+          <a:p>
+            <a:pPr marL="457200" indent="-457200">
+              <a:buFont typeface="Arial"/>
+              <a:buChar char="•"/>
+            </a:pPr>
+            <a:r>
+              <a:rPr lang="en-US" sz="3200" dirty="0" smtClean="0">
+                <a:latin typeface="Calibri"/>
+                <a:cs typeface="Calibri"/>
+              </a:rPr>
+              <a:t>Cannot-link enforced every time a new partial</a:t>
+            </a:r>
+            <a:br>
+              <a:rPr lang="en-US" sz="3200" dirty="0" smtClean="0">
+                <a:latin typeface="Calibri"/>
+                <a:cs typeface="Calibri"/>
+              </a:rPr>
+            </a:br>
+            <a:r>
+              <a:rPr lang="en-US" sz="3200" dirty="0" smtClean="0">
+                <a:latin typeface="Calibri"/>
+                <a:cs typeface="Calibri"/>
+              </a:rPr>
+              <a:t>path is explored.</a:t>
+            </a:r>
+          </a:p>
+          <a:p>
+            <a:pPr marL="457200" indent="-457200">
+              <a:buFont typeface="Arial"/>
+              <a:buChar char="•"/>
+            </a:pPr>
+            <a:r>
+              <a:rPr lang="en-US" sz="3200" dirty="0" smtClean="0">
+                <a:latin typeface="Calibri"/>
+                <a:cs typeface="Calibri"/>
+              </a:rPr>
+              <a:t>Must-link enforced every time a new complete</a:t>
+            </a:r>
+            <a:br>
+              <a:rPr lang="en-US" sz="3200" dirty="0" smtClean="0">
+                <a:latin typeface="Calibri"/>
+                <a:cs typeface="Calibri"/>
+              </a:rPr>
+            </a:br>
+            <a:r>
+              <a:rPr lang="en-US" sz="3200" dirty="0" smtClean="0">
+                <a:latin typeface="Calibri"/>
+                <a:cs typeface="Calibri"/>
+              </a:rPr>
+              <a:t>path is about to be added into the meta-path</a:t>
+            </a:r>
+            <a:br>
+              <a:rPr lang="en-US" sz="3200" dirty="0" smtClean="0">
+                <a:latin typeface="Calibri"/>
+                <a:cs typeface="Calibri"/>
+              </a:rPr>
+            </a:br>
+            <a:r>
+              <a:rPr lang="en-US" sz="3200" dirty="0" smtClean="0">
+                <a:latin typeface="Calibri"/>
+                <a:cs typeface="Calibri"/>
+              </a:rPr>
+              <a:t>set.</a:t>
+            </a:r>
           </a:p>
         </p:txBody>
       </p:sp>
     </p:spTree>
   </p:cSld>
+  <p:clrMapOvr>
+    <a:masterClrMapping/>
+  </p:clrMapOvr>
   <p:timing>
     <p:tnLst>
       <p:par>
-        <p:cTn id="17" dur="indefinite" restart="never" nodeType="tmRoot">
+        <p:cTn xmlns:p14="http://schemas.microsoft.com/office/powerpoint/2010/main" id="1" dur="indefinite" restart="never" nodeType="tmRoot">
           <p:childTnLst>
             <p:seq>
-              <p:cTn id="18" nodeType="mainSeq"/>
+              <p:cTn id="2" nodeType="mainSeq"/>
               <p:prevCondLst>
-                <p:cond delay="0" evt="onPrev">
+                <p:cond evt="onPrev" delay="0">
                   <p:tgtEl>
                     <p:sldTgt/>
                   </p:tgtEl>
                 </p:cond>
               </p:prevCondLst>
               <p:nextCondLst>
-                <p:cond delay="0" evt="onNext">
+                <p:cond evt="onNext" delay="0">
                   <p:tgtEl>
                     <p:sldTgt/>
                   </p:tgtEl>
@@ -6571,6 +6470,8 @@
       </a:bgFillStyleLst>
     </a:fmtScheme>
   </a:themeElements>
+  <a:objectDefaults/>
+  <a:extraClrSchemeLst/>
 </a:theme>
 </file>
 
@@ -6794,5 +6695,7 @@
       </a:bgFillStyleLst>
     </a:fmtScheme>
   </a:themeElements>
+  <a:objectDefaults/>
+  <a:extraClrSchemeLst/>
 </a:theme>
 </file>
</xml_diff>